<commit_message>
updated Who is Attunix slides
</commit_message>
<xml_diff>
--- a/Who_is_Attunix.pptx
+++ b/Who_is_Attunix.pptx
@@ -5,14 +5,16 @@
     <p:sldMasterId id="2147483648" r:id="rId1"/>
   </p:sldMasterIdLst>
   <p:notesMasterIdLst>
-    <p:notesMasterId r:id="rId7"/>
+    <p:notesMasterId r:id="rId9"/>
   </p:notesMasterIdLst>
   <p:sldIdLst>
     <p:sldId id="445" r:id="rId2"/>
     <p:sldId id="581" r:id="rId3"/>
     <p:sldId id="522" r:id="rId4"/>
     <p:sldId id="558" r:id="rId5"/>
-    <p:sldId id="589" r:id="rId6"/>
+    <p:sldId id="567" r:id="rId6"/>
+    <p:sldId id="569" r:id="rId7"/>
+    <p:sldId id="542" r:id="rId8"/>
   </p:sldIdLst>
   <p:sldSz cx="12192000" cy="6858000"/>
   <p:notesSz cx="6858000" cy="9144000"/>
@@ -111,6 +113,11 @@
       </a:defRPr>
     </a:lvl9pPr>
   </p:defaultTextStyle>
+  <p:extLst>
+    <p:ext uri="{EFAFB233-063F-42B5-8137-9DF3F51BA10A}">
+      <p15:sldGuideLst xmlns:p15="http://schemas.microsoft.com/office/powerpoint/2012/main"/>
+    </p:ext>
+  </p:extLst>
 </p:presentation>
 </file>
 
@@ -4580,7 +4587,7 @@
           <a:p>
             <a:fld id="{84EAEBB3-D0CD-465E-96DB-338620DB7A46}" type="datetimeFigureOut">
               <a:rPr lang="en-US" smtClean="0"/>
-              <a:t>9/25/2018</a:t>
+              <a:t>10/3/18</a:t>
             </a:fld>
             <a:endParaRPr lang="en-US"/>
           </a:p>
@@ -5413,7 +5420,217 @@
     </p:spTree>
     <p:extLst>
       <p:ext uri="{BB962C8B-B14F-4D97-AF65-F5344CB8AC3E}">
-        <p14:creationId xmlns:p14="http://schemas.microsoft.com/office/powerpoint/2010/main" val="1377177562"/>
+        <p14:creationId xmlns:p14="http://schemas.microsoft.com/office/powerpoint/2010/main" val="666919710"/>
+      </p:ext>
+    </p:extLst>
+  </p:cSld>
+  <p:clrMapOvr>
+    <a:masterClrMapping/>
+  </p:clrMapOvr>
+</p:notes>
+</file>
+
+<file path=ppt/notesSlides/notesSlide6.xml><?xml version="1.0" encoding="utf-8"?>
+<p:notes xmlns:a="http://schemas.openxmlformats.org/drawingml/2006/main" xmlns:r="http://schemas.openxmlformats.org/officeDocument/2006/relationships" xmlns:p="http://schemas.openxmlformats.org/presentationml/2006/main">
+  <p:cSld>
+    <p:spTree>
+      <p:nvGrpSpPr>
+        <p:cNvPr id="1" name=""/>
+        <p:cNvGrpSpPr/>
+        <p:nvPr/>
+      </p:nvGrpSpPr>
+      <p:grpSpPr>
+        <a:xfrm>
+          <a:off x="0" y="0"/>
+          <a:ext cx="0" cy="0"/>
+          <a:chOff x="0" y="0"/>
+          <a:chExt cx="0" cy="0"/>
+        </a:xfrm>
+      </p:grpSpPr>
+      <p:sp>
+        <p:nvSpPr>
+          <p:cNvPr id="2" name="Slide Image Placeholder 1"/>
+          <p:cNvSpPr>
+            <a:spLocks noGrp="1" noRot="1" noChangeAspect="1"/>
+          </p:cNvSpPr>
+          <p:nvPr>
+            <p:ph type="sldImg"/>
+          </p:nvPr>
+        </p:nvSpPr>
+        <p:spPr/>
+      </p:sp>
+      <p:sp>
+        <p:nvSpPr>
+          <p:cNvPr id="3" name="Notes Placeholder 2"/>
+          <p:cNvSpPr>
+            <a:spLocks noGrp="1"/>
+          </p:cNvSpPr>
+          <p:nvPr>
+            <p:ph type="body" idx="1"/>
+          </p:nvPr>
+        </p:nvSpPr>
+        <p:spPr/>
+        <p:txBody>
+          <a:bodyPr/>
+          <a:lstStyle/>
+          <a:p>
+            <a:r>
+              <a:rPr lang="en-US" dirty="0" err="1"/>
+              <a:t>IaC</a:t>
+            </a:r>
+            <a:r>
+              <a:rPr lang="en-US" dirty="0"/>
+              <a:t> = Infrastructure as Code</a:t>
+            </a:r>
+          </a:p>
+          <a:p>
+            <a:r>
+              <a:rPr lang="en-US" dirty="0"/>
+              <a:t>Make the center circle a Cloud Icon</a:t>
+            </a:r>
+          </a:p>
+          <a:p>
+            <a:r>
+              <a:rPr lang="en-US" dirty="0"/>
+              <a:t>New logo needed for Ident. </a:t>
+            </a:r>
+            <a:r>
+              <a:rPr lang="en-US" dirty="0" err="1"/>
+              <a:t>Mgmnt</a:t>
+            </a:r>
+            <a:r>
+              <a:rPr lang="en-US" dirty="0"/>
+              <a:t>. (Finger Print) or man with shield</a:t>
+            </a:r>
+          </a:p>
+          <a:p>
+            <a:r>
+              <a:rPr lang="en-US" dirty="0"/>
+              <a:t>Change logo datacenter assessment</a:t>
+            </a:r>
+          </a:p>
+          <a:p>
+            <a:endParaRPr lang="en-US" dirty="0"/>
+          </a:p>
+          <a:p>
+            <a:endParaRPr lang="en-US" dirty="0"/>
+          </a:p>
+          <a:p>
+            <a:endParaRPr lang="en-US" dirty="0"/>
+          </a:p>
+        </p:txBody>
+      </p:sp>
+      <p:sp>
+        <p:nvSpPr>
+          <p:cNvPr id="4" name="Slide Number Placeholder 3"/>
+          <p:cNvSpPr>
+            <a:spLocks noGrp="1"/>
+          </p:cNvSpPr>
+          <p:nvPr>
+            <p:ph type="sldNum" sz="quarter" idx="10"/>
+          </p:nvPr>
+        </p:nvSpPr>
+        <p:spPr/>
+        <p:txBody>
+          <a:bodyPr/>
+          <a:lstStyle/>
+          <a:p>
+            <a:fld id="{0596B549-DD33-4E69-BA3F-AA129120DD23}" type="slidenum">
+              <a:rPr lang="en-US" smtClean="0"/>
+              <a:t>6</a:t>
+            </a:fld>
+            <a:endParaRPr lang="en-US"/>
+          </a:p>
+        </p:txBody>
+      </p:sp>
+    </p:spTree>
+    <p:extLst>
+      <p:ext uri="{BB962C8B-B14F-4D97-AF65-F5344CB8AC3E}">
+        <p14:creationId xmlns:p14="http://schemas.microsoft.com/office/powerpoint/2010/main" val="2580370891"/>
+      </p:ext>
+    </p:extLst>
+  </p:cSld>
+  <p:clrMapOvr>
+    <a:masterClrMapping/>
+  </p:clrMapOvr>
+</p:notes>
+</file>
+
+<file path=ppt/notesSlides/notesSlide7.xml><?xml version="1.0" encoding="utf-8"?>
+<p:notes xmlns:a="http://schemas.openxmlformats.org/drawingml/2006/main" xmlns:r="http://schemas.openxmlformats.org/officeDocument/2006/relationships" xmlns:p="http://schemas.openxmlformats.org/presentationml/2006/main">
+  <p:cSld>
+    <p:spTree>
+      <p:nvGrpSpPr>
+        <p:cNvPr id="1" name=""/>
+        <p:cNvGrpSpPr/>
+        <p:nvPr/>
+      </p:nvGrpSpPr>
+      <p:grpSpPr>
+        <a:xfrm>
+          <a:off x="0" y="0"/>
+          <a:ext cx="0" cy="0"/>
+          <a:chOff x="0" y="0"/>
+          <a:chExt cx="0" cy="0"/>
+        </a:xfrm>
+      </p:grpSpPr>
+      <p:sp>
+        <p:nvSpPr>
+          <p:cNvPr id="2" name="Slide Image Placeholder 1"/>
+          <p:cNvSpPr>
+            <a:spLocks noGrp="1" noRot="1" noChangeAspect="1"/>
+          </p:cNvSpPr>
+          <p:nvPr>
+            <p:ph type="sldImg"/>
+          </p:nvPr>
+        </p:nvSpPr>
+        <p:spPr/>
+      </p:sp>
+      <p:sp>
+        <p:nvSpPr>
+          <p:cNvPr id="3" name="Notes Placeholder 2"/>
+          <p:cNvSpPr>
+            <a:spLocks noGrp="1"/>
+          </p:cNvSpPr>
+          <p:nvPr>
+            <p:ph type="body" idx="1"/>
+          </p:nvPr>
+        </p:nvSpPr>
+        <p:spPr/>
+        <p:txBody>
+          <a:bodyPr/>
+          <a:lstStyle/>
+          <a:p>
+            <a:endParaRPr lang="en-US" dirty="0"/>
+          </a:p>
+        </p:txBody>
+      </p:sp>
+      <p:sp>
+        <p:nvSpPr>
+          <p:cNvPr id="4" name="Slide Number Placeholder 3"/>
+          <p:cNvSpPr>
+            <a:spLocks noGrp="1"/>
+          </p:cNvSpPr>
+          <p:nvPr>
+            <p:ph type="sldNum" sz="quarter" idx="10"/>
+          </p:nvPr>
+        </p:nvSpPr>
+        <p:spPr/>
+        <p:txBody>
+          <a:bodyPr/>
+          <a:lstStyle/>
+          <a:p>
+            <a:fld id="{9107DFEE-27F3-4680-A828-F1AD76312123}" type="slidenum">
+              <a:rPr lang="en-US" smtClean="0"/>
+              <a:t>7</a:t>
+            </a:fld>
+            <a:endParaRPr lang="en-US" dirty="0"/>
+          </a:p>
+        </p:txBody>
+      </p:sp>
+    </p:spTree>
+    <p:extLst>
+      <p:ext uri="{BB962C8B-B14F-4D97-AF65-F5344CB8AC3E}">
+        <p14:creationId xmlns:p14="http://schemas.microsoft.com/office/powerpoint/2010/main" val="1851160360"/>
       </p:ext>
     </p:extLst>
   </p:cSld>
@@ -5570,7 +5787,7 @@
           <a:p>
             <a:fld id="{21E289AA-9535-45B5-997C-3737D8F9B645}" type="datetimeFigureOut">
               <a:rPr lang="en-US" smtClean="0"/>
-              <a:t>9/25/2018</a:t>
+              <a:t>10/3/18</a:t>
             </a:fld>
             <a:endParaRPr lang="en-US"/>
           </a:p>
@@ -5768,7 +5985,7 @@
           <a:p>
             <a:fld id="{21E289AA-9535-45B5-997C-3737D8F9B645}" type="datetimeFigureOut">
               <a:rPr lang="en-US" smtClean="0"/>
-              <a:t>9/25/2018</a:t>
+              <a:t>10/3/18</a:t>
             </a:fld>
             <a:endParaRPr lang="en-US"/>
           </a:p>
@@ -5976,7 +6193,7 @@
           <a:p>
             <a:fld id="{21E289AA-9535-45B5-997C-3737D8F9B645}" type="datetimeFigureOut">
               <a:rPr lang="en-US" smtClean="0"/>
-              <a:t>9/25/2018</a:t>
+              <a:t>10/3/18</a:t>
             </a:fld>
             <a:endParaRPr lang="en-US"/>
           </a:p>
@@ -6659,6 +6876,126 @@
 </p:sldLayout>
 </file>
 
+<file path=ppt/slideLayouts/slideLayout16.xml><?xml version="1.0" encoding="utf-8"?>
+<p:sldLayout xmlns:a="http://schemas.openxmlformats.org/drawingml/2006/main" xmlns:r="http://schemas.openxmlformats.org/officeDocument/2006/relationships" xmlns:p="http://schemas.openxmlformats.org/presentationml/2006/main" userDrawn="1">
+  <p:cSld name="End Slide">
+    <p:bg>
+      <p:bgPr>
+        <a:solidFill>
+          <a:srgbClr val="054466"/>
+        </a:solidFill>
+        <a:effectLst/>
+      </p:bgPr>
+    </p:bg>
+    <p:spTree>
+      <p:nvGrpSpPr>
+        <p:cNvPr id="1" name=""/>
+        <p:cNvGrpSpPr/>
+        <p:nvPr/>
+      </p:nvGrpSpPr>
+      <p:grpSpPr>
+        <a:xfrm>
+          <a:off x="0" y="0"/>
+          <a:ext cx="0" cy="0"/>
+          <a:chOff x="0" y="0"/>
+          <a:chExt cx="0" cy="0"/>
+        </a:xfrm>
+      </p:grpSpPr>
+      <p:sp>
+        <p:nvSpPr>
+          <p:cNvPr id="2" name="Title 1"/>
+          <p:cNvSpPr>
+            <a:spLocks noGrp="1"/>
+          </p:cNvSpPr>
+          <p:nvPr>
+            <p:ph type="title" hasCustomPrompt="1"/>
+          </p:nvPr>
+        </p:nvSpPr>
+        <p:spPr>
+          <a:xfrm>
+            <a:off x="5812752" y="2813811"/>
+            <a:ext cx="5769648" cy="1218795"/>
+          </a:xfrm>
+          <a:prstGeom prst="rect">
+            <a:avLst/>
+          </a:prstGeom>
+        </p:spPr>
+        <p:txBody>
+          <a:bodyPr vert="horz" wrap="square" lIns="0" tIns="0" rIns="0" bIns="0" anchor="ctr" anchorCtr="0">
+            <a:spAutoFit/>
+          </a:bodyPr>
+          <a:lstStyle>
+            <a:lvl1pPr algn="r">
+              <a:defRPr b="0" i="0">
+                <a:solidFill>
+                  <a:schemeClr val="bg1"/>
+                </a:solidFill>
+                <a:latin typeface="Gotham Light"/>
+                <a:cs typeface="Gotham Light"/>
+              </a:defRPr>
+            </a:lvl1pPr>
+          </a:lstStyle>
+          <a:p>
+            <a:r>
+              <a:rPr lang="en-US" dirty="0"/>
+              <a:t>Title</a:t>
+            </a:r>
+            <a:br>
+              <a:rPr lang="en-US" dirty="0"/>
+            </a:br>
+            <a:r>
+              <a:rPr lang="en-US" dirty="0"/>
+              <a:t>Goes Here</a:t>
+            </a:r>
+          </a:p>
+        </p:txBody>
+      </p:sp>
+      <p:pic>
+        <p:nvPicPr>
+          <p:cNvPr id="4" name="Picture 3"/>
+          <p:cNvPicPr>
+            <a:picLocks noChangeAspect="1"/>
+          </p:cNvPicPr>
+          <p:nvPr userDrawn="1"/>
+        </p:nvPicPr>
+        <p:blipFill>
+          <a:blip r:embed="rId2" cstate="print">
+            <a:extLst>
+              <a:ext uri="{28A0092B-C50C-407E-A947-70E740481C1C}">
+                <a14:useLocalDpi xmlns:a14="http://schemas.microsoft.com/office/drawing/2010/main" val="0"/>
+              </a:ext>
+            </a:extLst>
+          </a:blip>
+          <a:stretch>
+            <a:fillRect/>
+          </a:stretch>
+        </p:blipFill>
+        <p:spPr>
+          <a:xfrm>
+            <a:off x="10789218" y="6617495"/>
+            <a:ext cx="1238765" cy="168520"/>
+          </a:xfrm>
+          <a:prstGeom prst="rect">
+            <a:avLst/>
+          </a:prstGeom>
+        </p:spPr>
+      </p:pic>
+    </p:spTree>
+    <p:extLst>
+      <p:ext uri="{BB962C8B-B14F-4D97-AF65-F5344CB8AC3E}">
+        <p14:creationId xmlns:p14="http://schemas.microsoft.com/office/powerpoint/2010/main" val="2419598054"/>
+      </p:ext>
+    </p:extLst>
+  </p:cSld>
+  <p:clrMapOvr>
+    <a:masterClrMapping/>
+  </p:clrMapOvr>
+  <p:transition>
+    <p:dissolve/>
+  </p:transition>
+</p:sldLayout>
+</file>
+
 <file path=ppt/slideLayouts/slideLayout2.xml><?xml version="1.0" encoding="utf-8"?>
 <p:sldLayout xmlns:a="http://schemas.openxmlformats.org/drawingml/2006/main" xmlns:r="http://schemas.openxmlformats.org/officeDocument/2006/relationships" xmlns:p="http://schemas.openxmlformats.org/presentationml/2006/main" type="obj" preserve="1">
   <p:cSld name="Title and Content">
@@ -6784,7 +7121,7 @@
           <a:p>
             <a:fld id="{21E289AA-9535-45B5-997C-3737D8F9B645}" type="datetimeFigureOut">
               <a:rPr lang="en-US" smtClean="0"/>
-              <a:t>9/25/2018</a:t>
+              <a:t>10/3/18</a:t>
             </a:fld>
             <a:endParaRPr lang="en-US"/>
           </a:p>
@@ -7059,7 +7396,7 @@
           <a:p>
             <a:fld id="{21E289AA-9535-45B5-997C-3737D8F9B645}" type="datetimeFigureOut">
               <a:rPr lang="en-US" smtClean="0"/>
-              <a:t>9/25/2018</a:t>
+              <a:t>10/3/18</a:t>
             </a:fld>
             <a:endParaRPr lang="en-US"/>
           </a:p>
@@ -7324,7 +7661,7 @@
           <a:p>
             <a:fld id="{21E289AA-9535-45B5-997C-3737D8F9B645}" type="datetimeFigureOut">
               <a:rPr lang="en-US" smtClean="0"/>
-              <a:t>9/25/2018</a:t>
+              <a:t>10/3/18</a:t>
             </a:fld>
             <a:endParaRPr lang="en-US"/>
           </a:p>
@@ -7736,7 +8073,7 @@
           <a:p>
             <a:fld id="{21E289AA-9535-45B5-997C-3737D8F9B645}" type="datetimeFigureOut">
               <a:rPr lang="en-US" smtClean="0"/>
-              <a:t>9/25/2018</a:t>
+              <a:t>10/3/18</a:t>
             </a:fld>
             <a:endParaRPr lang="en-US"/>
           </a:p>
@@ -7877,7 +8214,7 @@
           <a:p>
             <a:fld id="{21E289AA-9535-45B5-997C-3737D8F9B645}" type="datetimeFigureOut">
               <a:rPr lang="en-US" smtClean="0"/>
-              <a:t>9/25/2018</a:t>
+              <a:t>10/3/18</a:t>
             </a:fld>
             <a:endParaRPr lang="en-US"/>
           </a:p>
@@ -7990,7 +8327,7 @@
           <a:p>
             <a:fld id="{21E289AA-9535-45B5-997C-3737D8F9B645}" type="datetimeFigureOut">
               <a:rPr lang="en-US" smtClean="0"/>
-              <a:t>9/25/2018</a:t>
+              <a:t>10/3/18</a:t>
             </a:fld>
             <a:endParaRPr lang="en-US"/>
           </a:p>
@@ -8301,7 +8638,7 @@
           <a:p>
             <a:fld id="{21E289AA-9535-45B5-997C-3737D8F9B645}" type="datetimeFigureOut">
               <a:rPr lang="en-US" smtClean="0"/>
-              <a:t>9/25/2018</a:t>
+              <a:t>10/3/18</a:t>
             </a:fld>
             <a:endParaRPr lang="en-US"/>
           </a:p>
@@ -8589,7 +8926,7 @@
           <a:p>
             <a:fld id="{21E289AA-9535-45B5-997C-3737D8F9B645}" type="datetimeFigureOut">
               <a:rPr lang="en-US" smtClean="0"/>
-              <a:t>9/25/2018</a:t>
+              <a:t>10/3/18</a:t>
             </a:fld>
             <a:endParaRPr lang="en-US"/>
           </a:p>
@@ -8830,7 +9167,7 @@
           <a:p>
             <a:fld id="{21E289AA-9535-45B5-997C-3737D8F9B645}" type="datetimeFigureOut">
               <a:rPr lang="en-US" smtClean="0"/>
-              <a:t>9/25/2018</a:t>
+              <a:t>10/3/18</a:t>
             </a:fld>
             <a:endParaRPr lang="en-US"/>
           </a:p>
@@ -8950,6 +9287,7 @@
     <p:sldLayoutId id="2147483661" r:id="rId13"/>
     <p:sldLayoutId id="2147483662" r:id="rId14"/>
     <p:sldLayoutId id="2147483663" r:id="rId15"/>
+    <p:sldLayoutId id="2147483664" r:id="rId16"/>
   </p:sldLayoutIdLst>
   <p:txStyles>
     <p:titleStyle>
@@ -13291,7 +13629,7 @@
                     <a:srgbClr val="FFFFFF"/>
                   </a:solidFill>
                 </a:rPr>
-                <a:t>Governance | Compliance</a:t>
+                <a:t>VMware | Hyper-V | OSS | Windows | Linux</a:t>
               </a:r>
             </a:p>
             <a:p>
@@ -13305,7 +13643,7 @@
                     <a:srgbClr val="FFFFFF"/>
                   </a:solidFill>
                 </a:rPr>
-                <a:t>VMware | Hyper-V | Windows | Linux | OSS</a:t>
+                <a:t>Governance | Compliance</a:t>
               </a:r>
             </a:p>
             <a:p>
@@ -13493,7 +13831,7 @@
               <a:r>
                 <a:rPr lang="en-US" b="1" dirty="0">
                   <a:solidFill>
-                    <a:schemeClr val="bg1"/>
+                    <a:srgbClr val="39B54A"/>
                   </a:solidFill>
                   <a:latin typeface="Calibri"/>
                 </a:rPr>
@@ -14020,7 +14358,7 @@
               <a:r>
                 <a:rPr lang="en-US" b="1" dirty="0">
                   <a:solidFill>
-                    <a:schemeClr val="bg1"/>
+                    <a:srgbClr val="000000"/>
                   </a:solidFill>
                   <a:latin typeface="Calibri"/>
                 </a:rPr>
@@ -14508,8 +14846,23 @@
                   </a:solidFill>
                   <a:latin typeface="Calibri"/>
                 </a:rPr>
-                <a:t>Application Migration &amp; Re-Platform</a:t>
+                <a:t>Application Migration &amp; </a:t>
               </a:r>
+              <a:r>
+                <a:rPr lang="en-US" sz="1400" dirty="0" err="1">
+                  <a:solidFill>
+                    <a:srgbClr val="FFFFFF"/>
+                  </a:solidFill>
+                  <a:latin typeface="Calibri"/>
+                </a:rPr>
+                <a:t>RePlatform</a:t>
+              </a:r>
+              <a:endParaRPr lang="en-US" sz="1400" dirty="0">
+                <a:solidFill>
+                  <a:srgbClr val="FFFFFF"/>
+                </a:solidFill>
+                <a:latin typeface="Calibri"/>
+              </a:endParaRPr>
             </a:p>
             <a:p>
               <a:pPr marL="285737" indent="-285737" defTabSz="1243594">
@@ -14678,7 +15031,7 @@
               <a:r>
                 <a:rPr lang="en-US" b="1" dirty="0">
                   <a:solidFill>
-                    <a:schemeClr val="bg1"/>
+                    <a:srgbClr val="000000"/>
                   </a:solidFill>
                   <a:latin typeface="Calibri"/>
                 </a:rPr>
@@ -15267,7 +15620,7 @@
             <a:r>
               <a:rPr lang="en-US" b="1" dirty="0">
                 <a:solidFill>
-                  <a:schemeClr val="bg1"/>
+                  <a:srgbClr val="39B54A"/>
                 </a:solidFill>
                 <a:latin typeface="Calibri"/>
               </a:rPr>
@@ -16031,20 +16384,14 @@
               <a:buChar char="ü"/>
             </a:pPr>
             <a:r>
-              <a:rPr lang="en-US" sz="1400" dirty="0" err="1">
+              <a:rPr lang="en-US" sz="1400" dirty="0">
                 <a:solidFill>
                   <a:srgbClr val="FFFFFF"/>
                 </a:solidFill>
                 <a:latin typeface="Calibri"/>
               </a:rPr>
-              <a:t>Tereform</a:t>
+              <a:t>Terraform</a:t>
             </a:r>
-            <a:endParaRPr lang="en-US" sz="1400" dirty="0">
-              <a:solidFill>
-                <a:srgbClr val="FFFFFF"/>
-              </a:solidFill>
-              <a:latin typeface="Calibri"/>
-            </a:endParaRPr>
           </a:p>
         </p:txBody>
       </p:sp>
@@ -16186,7 +16533,7 @@
                   <a:srgbClr val="FFFFFF"/>
                 </a:solidFill>
               </a:rPr>
-              <a:t>| Application360</a:t>
+              <a:t>|  Application360</a:t>
             </a:r>
             <a:endParaRPr lang="en-US" sz="1400" dirty="0">
               <a:solidFill>
@@ -16327,21 +16674,2064 @@
                 </a:solidFill>
                 <a:latin typeface="Calibri"/>
               </a:rPr>
-              <a:t>DR |  Infrastructure360  |  Digital Transformation</a:t>
+              <a:t>DR  |  Infrastructure360  |  Digital Transformation</a:t>
             </a:r>
           </a:p>
         </p:txBody>
       </p:sp>
+      <p:pic>
+        <p:nvPicPr>
+          <p:cNvPr id="55" name="Picture 54">
+            <a:extLst>
+              <a:ext uri="{FF2B5EF4-FFF2-40B4-BE49-F238E27FC236}">
+                <a16:creationId xmlns:a16="http://schemas.microsoft.com/office/drawing/2014/main" id="{6EB3C754-ED6E-40FE-9856-69D4E351C60C}"/>
+              </a:ext>
+            </a:extLst>
+          </p:cNvPr>
+          <p:cNvPicPr>
+            <a:picLocks noChangeAspect="1"/>
+          </p:cNvPicPr>
+          <p:nvPr/>
+        </p:nvPicPr>
+        <p:blipFill rotWithShape="1">
+          <a:blip r:embed="rId12" cstate="print">
+            <a:extLst>
+              <a:ext uri="{28A0092B-C50C-407E-A947-70E740481C1C}">
+                <a14:useLocalDpi xmlns:a14="http://schemas.microsoft.com/office/drawing/2010/main" val="0"/>
+              </a:ext>
+            </a:extLst>
+          </a:blip>
+          <a:srcRect r="73194"/>
+          <a:stretch/>
+        </p:blipFill>
+        <p:spPr>
+          <a:xfrm>
+            <a:off x="463844" y="5288948"/>
+            <a:ext cx="593984" cy="883797"/>
+          </a:xfrm>
+          <a:prstGeom prst="rect">
+            <a:avLst/>
+          </a:prstGeom>
+        </p:spPr>
+      </p:pic>
     </p:spTree>
     <p:extLst>
       <p:ext uri="{BB962C8B-B14F-4D97-AF65-F5344CB8AC3E}">
-        <p14:creationId xmlns:p14="http://schemas.microsoft.com/office/powerpoint/2010/main" val="97327064"/>
+        <p14:creationId xmlns:p14="http://schemas.microsoft.com/office/powerpoint/2010/main" val="248230876"/>
       </p:ext>
     </p:extLst>
   </p:cSld>
   <p:clrMapOvr>
     <a:masterClrMapping/>
   </p:clrMapOvr>
+</p:sld>
+</file>
+
+<file path=ppt/slides/slide6.xml><?xml version="1.0" encoding="utf-8"?>
+<p:sld xmlns:a="http://schemas.openxmlformats.org/drawingml/2006/main" xmlns:r="http://schemas.openxmlformats.org/officeDocument/2006/relationships" xmlns:p="http://schemas.openxmlformats.org/presentationml/2006/main">
+  <p:cSld>
+    <p:spTree>
+      <p:nvGrpSpPr>
+        <p:cNvPr id="1" name=""/>
+        <p:cNvGrpSpPr/>
+        <p:nvPr/>
+      </p:nvGrpSpPr>
+      <p:grpSpPr>
+        <a:xfrm>
+          <a:off x="0" y="0"/>
+          <a:ext cx="0" cy="0"/>
+          <a:chOff x="0" y="0"/>
+          <a:chExt cx="0" cy="0"/>
+        </a:xfrm>
+      </p:grpSpPr>
+      <p:sp>
+        <p:nvSpPr>
+          <p:cNvPr id="221" name="Rectangle 220">
+            <a:extLst>
+              <a:ext uri="{FF2B5EF4-FFF2-40B4-BE49-F238E27FC236}">
+                <a16:creationId xmlns:a16="http://schemas.microsoft.com/office/drawing/2014/main" id="{46FCE001-4A60-406E-A9D4-98822C13EEB2}"/>
+              </a:ext>
+            </a:extLst>
+          </p:cNvPr>
+          <p:cNvSpPr/>
+          <p:nvPr/>
+        </p:nvSpPr>
+        <p:spPr>
+          <a:xfrm>
+            <a:off x="8424920" y="0"/>
+            <a:ext cx="3767081" cy="6858000"/>
+          </a:xfrm>
+          <a:prstGeom prst="rect">
+            <a:avLst/>
+          </a:prstGeom>
+          <a:solidFill>
+            <a:schemeClr val="bg1">
+              <a:lumMod val="65000"/>
+              <a:alpha val="68000"/>
+            </a:schemeClr>
+          </a:solidFill>
+          <a:ln>
+            <a:noFill/>
+          </a:ln>
+        </p:spPr>
+        <p:style>
+          <a:lnRef idx="0">
+            <a:scrgbClr r="0" g="0" b="0"/>
+          </a:lnRef>
+          <a:fillRef idx="0">
+            <a:scrgbClr r="0" g="0" b="0"/>
+          </a:fillRef>
+          <a:effectRef idx="0">
+            <a:scrgbClr r="0" g="0" b="0"/>
+          </a:effectRef>
+          <a:fontRef idx="minor">
+            <a:schemeClr val="lt1"/>
+          </a:fontRef>
+        </p:style>
+        <p:txBody>
+          <a:bodyPr rtlCol="0" anchor="ctr"/>
+          <a:lstStyle/>
+          <a:p>
+            <a:pPr algn="ctr"/>
+            <a:endParaRPr lang="en-US" sz="2400"/>
+          </a:p>
+        </p:txBody>
+      </p:sp>
+      <p:grpSp>
+        <p:nvGrpSpPr>
+          <p:cNvPr id="167" name="Group 166">
+            <a:extLst>
+              <a:ext uri="{FF2B5EF4-FFF2-40B4-BE49-F238E27FC236}">
+                <a16:creationId xmlns:a16="http://schemas.microsoft.com/office/drawing/2014/main" id="{642AC96C-F7B4-4B96-A561-9614A22C3CCC}"/>
+              </a:ext>
+            </a:extLst>
+          </p:cNvPr>
+          <p:cNvGrpSpPr/>
+          <p:nvPr/>
+        </p:nvGrpSpPr>
+        <p:grpSpPr>
+          <a:xfrm>
+            <a:off x="811223" y="1868368"/>
+            <a:ext cx="1041632" cy="763683"/>
+            <a:chOff x="715561" y="2217113"/>
+            <a:chExt cx="781224" cy="572762"/>
+          </a:xfrm>
+        </p:grpSpPr>
+        <p:sp>
+          <p:nvSpPr>
+            <p:cNvPr id="42" name="Rectangle 41">
+              <a:extLst>
+                <a:ext uri="{FF2B5EF4-FFF2-40B4-BE49-F238E27FC236}">
+                  <a16:creationId xmlns:a16="http://schemas.microsoft.com/office/drawing/2014/main" id="{6DC74611-0868-4F8E-8CF0-0C878E5F1408}"/>
+                </a:ext>
+              </a:extLst>
+            </p:cNvPr>
+            <p:cNvSpPr/>
+            <p:nvPr/>
+          </p:nvSpPr>
+          <p:spPr>
+            <a:xfrm>
+              <a:off x="715561" y="2559042"/>
+              <a:ext cx="781224" cy="230833"/>
+            </a:xfrm>
+            <a:prstGeom prst="rect">
+              <a:avLst/>
+            </a:prstGeom>
+          </p:spPr>
+          <p:txBody>
+            <a:bodyPr wrap="none">
+              <a:spAutoFit/>
+            </a:bodyPr>
+            <a:lstStyle/>
+            <a:p>
+              <a:r>
+                <a:rPr lang="en-IN" sz="1400" b="1" cap="small" dirty="0">
+                  <a:solidFill>
+                    <a:schemeClr val="tx1">
+                      <a:lumMod val="75000"/>
+                      <a:lumOff val="25000"/>
+                    </a:schemeClr>
+                  </a:solidFill>
+                </a:rPr>
+                <a:t>Monitoring</a:t>
+              </a:r>
+            </a:p>
+          </p:txBody>
+        </p:sp>
+        <p:pic>
+          <p:nvPicPr>
+            <p:cNvPr id="58" name="Picture 57">
+              <a:extLst>
+                <a:ext uri="{FF2B5EF4-FFF2-40B4-BE49-F238E27FC236}">
+                  <a16:creationId xmlns:a16="http://schemas.microsoft.com/office/drawing/2014/main" id="{102AC145-A359-4889-B038-4ACCBC1C6B2F}"/>
+                </a:ext>
+              </a:extLst>
+            </p:cNvPr>
+            <p:cNvPicPr>
+              <a:picLocks noChangeAspect="1"/>
+            </p:cNvPicPr>
+            <p:nvPr/>
+          </p:nvPicPr>
+          <p:blipFill>
+            <a:blip r:embed="rId3" cstate="email">
+              <a:extLst>
+                <a:ext uri="{28A0092B-C50C-407E-A947-70E740481C1C}">
+                  <a14:useLocalDpi xmlns:a14="http://schemas.microsoft.com/office/drawing/2010/main" val="0"/>
+                </a:ext>
+              </a:extLst>
+            </a:blip>
+            <a:stretch>
+              <a:fillRect/>
+            </a:stretch>
+          </p:blipFill>
+          <p:spPr>
+            <a:xfrm>
+              <a:off x="976414" y="2217113"/>
+              <a:ext cx="300950" cy="300950"/>
+            </a:xfrm>
+            <a:prstGeom prst="rect">
+              <a:avLst/>
+            </a:prstGeom>
+          </p:spPr>
+        </p:pic>
+      </p:grpSp>
+      <p:grpSp>
+        <p:nvGrpSpPr>
+          <p:cNvPr id="183" name="Group 182">
+            <a:extLst>
+              <a:ext uri="{FF2B5EF4-FFF2-40B4-BE49-F238E27FC236}">
+                <a16:creationId xmlns:a16="http://schemas.microsoft.com/office/drawing/2014/main" id="{BEA09BEB-36FA-4D4A-9E1B-ECC6D0DA4371}"/>
+              </a:ext>
+            </a:extLst>
+          </p:cNvPr>
+          <p:cNvGrpSpPr/>
+          <p:nvPr/>
+        </p:nvGrpSpPr>
+        <p:grpSpPr>
+          <a:xfrm>
+            <a:off x="4884157" y="5387527"/>
+            <a:ext cx="1099468" cy="898481"/>
+            <a:chOff x="4516068" y="3931216"/>
+            <a:chExt cx="824601" cy="673861"/>
+          </a:xfrm>
+        </p:grpSpPr>
+        <p:sp>
+          <p:nvSpPr>
+            <p:cNvPr id="53" name="Rectangle 52">
+              <a:extLst>
+                <a:ext uri="{FF2B5EF4-FFF2-40B4-BE49-F238E27FC236}">
+                  <a16:creationId xmlns:a16="http://schemas.microsoft.com/office/drawing/2014/main" id="{DA2D7FF7-18D7-4355-A91C-5FB7E15FB143}"/>
+                </a:ext>
+              </a:extLst>
+            </p:cNvPr>
+            <p:cNvSpPr/>
+            <p:nvPr/>
+          </p:nvSpPr>
+          <p:spPr>
+            <a:xfrm>
+              <a:off x="4516068" y="4212662"/>
+              <a:ext cx="824601" cy="392415"/>
+            </a:xfrm>
+            <a:prstGeom prst="rect">
+              <a:avLst/>
+            </a:prstGeom>
+          </p:spPr>
+          <p:txBody>
+            <a:bodyPr wrap="none">
+              <a:spAutoFit/>
+            </a:bodyPr>
+            <a:lstStyle/>
+            <a:p>
+              <a:pPr algn="ctr"/>
+              <a:r>
+                <a:rPr lang="en-IN" sz="1400" b="1" cap="small" dirty="0" err="1">
+                  <a:solidFill>
+                    <a:srgbClr val="183340"/>
+                  </a:solidFill>
+                </a:rPr>
+                <a:t>Datacenter</a:t>
+              </a:r>
+              <a:endParaRPr lang="en-IN" sz="1400" b="1" cap="small" dirty="0">
+                <a:solidFill>
+                  <a:srgbClr val="183340"/>
+                </a:solidFill>
+              </a:endParaRPr>
+            </a:p>
+            <a:p>
+              <a:pPr algn="ctr"/>
+              <a:r>
+                <a:rPr lang="en-IN" sz="1400" b="1" cap="small" dirty="0">
+                  <a:solidFill>
+                    <a:srgbClr val="183340"/>
+                  </a:solidFill>
+                </a:rPr>
+                <a:t> Assessments</a:t>
+              </a:r>
+            </a:p>
+          </p:txBody>
+        </p:sp>
+        <p:pic>
+          <p:nvPicPr>
+            <p:cNvPr id="62" name="Picture 61">
+              <a:extLst>
+                <a:ext uri="{FF2B5EF4-FFF2-40B4-BE49-F238E27FC236}">
+                  <a16:creationId xmlns:a16="http://schemas.microsoft.com/office/drawing/2014/main" id="{BD6F3DD0-EF31-4366-8B5A-FF7C2C1D64CD}"/>
+                </a:ext>
+              </a:extLst>
+            </p:cNvPr>
+            <p:cNvPicPr>
+              <a:picLocks noChangeAspect="1"/>
+            </p:cNvPicPr>
+            <p:nvPr/>
+          </p:nvPicPr>
+          <p:blipFill>
+            <a:blip r:embed="rId4" cstate="email">
+              <a:extLst>
+                <a:ext uri="{28A0092B-C50C-407E-A947-70E740481C1C}">
+                  <a14:useLocalDpi xmlns:a14="http://schemas.microsoft.com/office/drawing/2010/main" val="0"/>
+                </a:ext>
+              </a:extLst>
+            </a:blip>
+            <a:stretch>
+              <a:fillRect/>
+            </a:stretch>
+          </p:blipFill>
+          <p:spPr>
+            <a:xfrm>
+              <a:off x="4731634" y="3931216"/>
+              <a:ext cx="338395" cy="278356"/>
+            </a:xfrm>
+            <a:prstGeom prst="rect">
+              <a:avLst/>
+            </a:prstGeom>
+          </p:spPr>
+        </p:pic>
+      </p:grpSp>
+      <p:grpSp>
+        <p:nvGrpSpPr>
+          <p:cNvPr id="178" name="Group 177">
+            <a:extLst>
+              <a:ext uri="{FF2B5EF4-FFF2-40B4-BE49-F238E27FC236}">
+                <a16:creationId xmlns:a16="http://schemas.microsoft.com/office/drawing/2014/main" id="{9A7133A1-8559-43DE-B189-9C1E4194EB6B}"/>
+              </a:ext>
+            </a:extLst>
+          </p:cNvPr>
+          <p:cNvGrpSpPr/>
+          <p:nvPr/>
+        </p:nvGrpSpPr>
+        <p:grpSpPr>
+          <a:xfrm>
+            <a:off x="1065064" y="4213085"/>
+            <a:ext cx="1100173" cy="583288"/>
+            <a:chOff x="3971887" y="933869"/>
+            <a:chExt cx="825130" cy="437466"/>
+          </a:xfrm>
+        </p:grpSpPr>
+        <p:sp>
+          <p:nvSpPr>
+            <p:cNvPr id="46" name="Rectangle 45">
+              <a:extLst>
+                <a:ext uri="{FF2B5EF4-FFF2-40B4-BE49-F238E27FC236}">
+                  <a16:creationId xmlns:a16="http://schemas.microsoft.com/office/drawing/2014/main" id="{1A38A7A7-48D8-440C-B960-EAD84B1A0972}"/>
+                </a:ext>
+              </a:extLst>
+            </p:cNvPr>
+            <p:cNvSpPr/>
+            <p:nvPr/>
+          </p:nvSpPr>
+          <p:spPr>
+            <a:xfrm>
+              <a:off x="3971887" y="1140502"/>
+              <a:ext cx="825130" cy="230833"/>
+            </a:xfrm>
+            <a:prstGeom prst="rect">
+              <a:avLst/>
+            </a:prstGeom>
+          </p:spPr>
+          <p:txBody>
+            <a:bodyPr wrap="none">
+              <a:spAutoFit/>
+            </a:bodyPr>
+            <a:lstStyle/>
+            <a:p>
+              <a:r>
+                <a:rPr lang="en-IN" sz="1400" b="1" cap="small" dirty="0">
+                  <a:solidFill>
+                    <a:srgbClr val="183340"/>
+                  </a:solidFill>
+                </a:rPr>
+                <a:t>Optimization</a:t>
+              </a:r>
+            </a:p>
+          </p:txBody>
+        </p:sp>
+        <p:pic>
+          <p:nvPicPr>
+            <p:cNvPr id="63" name="Picture 62">
+              <a:extLst>
+                <a:ext uri="{FF2B5EF4-FFF2-40B4-BE49-F238E27FC236}">
+                  <a16:creationId xmlns:a16="http://schemas.microsoft.com/office/drawing/2014/main" id="{6F78232A-6539-48E8-88A6-F0323A5B0948}"/>
+                </a:ext>
+              </a:extLst>
+            </p:cNvPr>
+            <p:cNvPicPr>
+              <a:picLocks noChangeAspect="1"/>
+            </p:cNvPicPr>
+            <p:nvPr/>
+          </p:nvPicPr>
+          <p:blipFill>
+            <a:blip r:embed="rId5" cstate="print">
+              <a:extLst>
+                <a:ext uri="{28A0092B-C50C-407E-A947-70E740481C1C}">
+                  <a14:useLocalDpi xmlns:a14="http://schemas.microsoft.com/office/drawing/2010/main" val="0"/>
+                </a:ext>
+              </a:extLst>
+            </a:blip>
+            <a:stretch>
+              <a:fillRect/>
+            </a:stretch>
+          </p:blipFill>
+          <p:spPr>
+            <a:xfrm>
+              <a:off x="4244661" y="933869"/>
+              <a:ext cx="334823" cy="222149"/>
+            </a:xfrm>
+            <a:prstGeom prst="rect">
+              <a:avLst/>
+            </a:prstGeom>
+          </p:spPr>
+        </p:pic>
+      </p:grpSp>
+      <p:grpSp>
+        <p:nvGrpSpPr>
+          <p:cNvPr id="184" name="Group 183">
+            <a:extLst>
+              <a:ext uri="{FF2B5EF4-FFF2-40B4-BE49-F238E27FC236}">
+                <a16:creationId xmlns:a16="http://schemas.microsoft.com/office/drawing/2014/main" id="{D48DB0DD-2D91-4C55-A9BC-C65FEB47788F}"/>
+              </a:ext>
+            </a:extLst>
+          </p:cNvPr>
+          <p:cNvGrpSpPr/>
+          <p:nvPr/>
+        </p:nvGrpSpPr>
+        <p:grpSpPr>
+          <a:xfrm>
+            <a:off x="3335113" y="5784924"/>
+            <a:ext cx="925959" cy="618105"/>
+            <a:chOff x="3334577" y="4118801"/>
+            <a:chExt cx="694469" cy="463579"/>
+          </a:xfrm>
+        </p:grpSpPr>
+        <p:sp>
+          <p:nvSpPr>
+            <p:cNvPr id="51" name="Rectangle 50">
+              <a:extLst>
+                <a:ext uri="{FF2B5EF4-FFF2-40B4-BE49-F238E27FC236}">
+                  <a16:creationId xmlns:a16="http://schemas.microsoft.com/office/drawing/2014/main" id="{34BF0420-98AA-4C2D-9041-E23416FF481F}"/>
+                </a:ext>
+              </a:extLst>
+            </p:cNvPr>
+            <p:cNvSpPr/>
+            <p:nvPr/>
+          </p:nvSpPr>
+          <p:spPr>
+            <a:xfrm>
+              <a:off x="3334577" y="4351547"/>
+              <a:ext cx="694469" cy="230833"/>
+            </a:xfrm>
+            <a:prstGeom prst="rect">
+              <a:avLst/>
+            </a:prstGeom>
+          </p:spPr>
+          <p:txBody>
+            <a:bodyPr wrap="none">
+              <a:spAutoFit/>
+            </a:bodyPr>
+            <a:lstStyle/>
+            <a:p>
+              <a:r>
+                <a:rPr lang="en-IN" sz="1400" b="1" cap="small" dirty="0">
+                  <a:solidFill>
+                    <a:srgbClr val="183340"/>
+                  </a:solidFill>
+                </a:rPr>
+                <a:t>Cloud VDI</a:t>
+              </a:r>
+            </a:p>
+          </p:txBody>
+        </p:sp>
+        <p:grpSp>
+          <p:nvGrpSpPr>
+            <p:cNvPr id="65" name="Group 64">
+              <a:extLst>
+                <a:ext uri="{FF2B5EF4-FFF2-40B4-BE49-F238E27FC236}">
+                  <a16:creationId xmlns:a16="http://schemas.microsoft.com/office/drawing/2014/main" id="{DC98787C-4D76-4A41-8618-9D642BAB9135}"/>
+                </a:ext>
+              </a:extLst>
+            </p:cNvPr>
+            <p:cNvGrpSpPr/>
+            <p:nvPr/>
+          </p:nvGrpSpPr>
+          <p:grpSpPr>
+            <a:xfrm>
+              <a:off x="3509692" y="4118801"/>
+              <a:ext cx="409396" cy="273418"/>
+              <a:chOff x="9614077" y="1749436"/>
+              <a:chExt cx="1063729" cy="710418"/>
+            </a:xfrm>
+          </p:grpSpPr>
+          <p:pic>
+            <p:nvPicPr>
+              <p:cNvPr id="66" name="Picture 65">
+                <a:extLst>
+                  <a:ext uri="{FF2B5EF4-FFF2-40B4-BE49-F238E27FC236}">
+                    <a16:creationId xmlns:a16="http://schemas.microsoft.com/office/drawing/2014/main" id="{55E46407-0030-462C-9ABC-66170D2293F7}"/>
+                  </a:ext>
+                </a:extLst>
+              </p:cNvPr>
+              <p:cNvPicPr>
+                <a:picLocks noChangeAspect="1"/>
+              </p:cNvPicPr>
+              <p:nvPr/>
+            </p:nvPicPr>
+            <p:blipFill>
+              <a:blip r:embed="rId6" cstate="email">
+                <a:extLst>
+                  <a:ext uri="{28A0092B-C50C-407E-A947-70E740481C1C}">
+                    <a14:useLocalDpi xmlns:a14="http://schemas.microsoft.com/office/drawing/2010/main" val="0"/>
+                  </a:ext>
+                </a:extLst>
+              </a:blip>
+              <a:stretch>
+                <a:fillRect/>
+              </a:stretch>
+            </p:blipFill>
+            <p:spPr>
+              <a:xfrm>
+                <a:off x="9614077" y="1749436"/>
+                <a:ext cx="587495" cy="587495"/>
+              </a:xfrm>
+              <a:prstGeom prst="rect">
+                <a:avLst/>
+              </a:prstGeom>
+            </p:spPr>
+          </p:pic>
+          <p:pic>
+            <p:nvPicPr>
+              <p:cNvPr id="67" name="Picture 66">
+                <a:extLst>
+                  <a:ext uri="{FF2B5EF4-FFF2-40B4-BE49-F238E27FC236}">
+                    <a16:creationId xmlns:a16="http://schemas.microsoft.com/office/drawing/2014/main" id="{DF112B00-C3FF-4A45-BF1C-94429328FBDD}"/>
+                  </a:ext>
+                </a:extLst>
+              </p:cNvPr>
+              <p:cNvPicPr>
+                <a:picLocks noChangeAspect="1"/>
+              </p:cNvPicPr>
+              <p:nvPr/>
+            </p:nvPicPr>
+            <p:blipFill>
+              <a:blip r:embed="rId7" cstate="email">
+                <a:extLst>
+                  <a:ext uri="{28A0092B-C50C-407E-A947-70E740481C1C}">
+                    <a14:useLocalDpi xmlns:a14="http://schemas.microsoft.com/office/drawing/2010/main" val="0"/>
+                  </a:ext>
+                </a:extLst>
+              </a:blip>
+              <a:stretch>
+                <a:fillRect/>
+              </a:stretch>
+            </p:blipFill>
+            <p:spPr>
+              <a:xfrm rot="5400000">
+                <a:off x="9992945" y="1774993"/>
+                <a:ext cx="684861" cy="684861"/>
+              </a:xfrm>
+              <a:prstGeom prst="rect">
+                <a:avLst/>
+              </a:prstGeom>
+            </p:spPr>
+          </p:pic>
+        </p:grpSp>
+      </p:grpSp>
+      <p:grpSp>
+        <p:nvGrpSpPr>
+          <p:cNvPr id="179" name="Group 178">
+            <a:extLst>
+              <a:ext uri="{FF2B5EF4-FFF2-40B4-BE49-F238E27FC236}">
+                <a16:creationId xmlns:a16="http://schemas.microsoft.com/office/drawing/2014/main" id="{FCCD00EC-BDDF-4868-BA30-4766BDCB07D2}"/>
+              </a:ext>
+            </a:extLst>
+          </p:cNvPr>
+          <p:cNvGrpSpPr/>
+          <p:nvPr/>
+        </p:nvGrpSpPr>
+        <p:grpSpPr>
+          <a:xfrm>
+            <a:off x="5450545" y="1228748"/>
+            <a:ext cx="1463671" cy="692000"/>
+            <a:chOff x="4871989" y="940819"/>
+            <a:chExt cx="1097753" cy="519000"/>
+          </a:xfrm>
+        </p:grpSpPr>
+        <p:sp>
+          <p:nvSpPr>
+            <p:cNvPr id="47" name="Rectangle 46">
+              <a:extLst>
+                <a:ext uri="{FF2B5EF4-FFF2-40B4-BE49-F238E27FC236}">
+                  <a16:creationId xmlns:a16="http://schemas.microsoft.com/office/drawing/2014/main" id="{6750A3E8-CC0D-47EB-8A3B-D4799205390A}"/>
+                </a:ext>
+              </a:extLst>
+            </p:cNvPr>
+            <p:cNvSpPr/>
+            <p:nvPr/>
+          </p:nvSpPr>
+          <p:spPr>
+            <a:xfrm>
+              <a:off x="4871989" y="1228986"/>
+              <a:ext cx="1097753" cy="230833"/>
+            </a:xfrm>
+            <a:prstGeom prst="rect">
+              <a:avLst/>
+            </a:prstGeom>
+          </p:spPr>
+          <p:txBody>
+            <a:bodyPr wrap="none">
+              <a:spAutoFit/>
+            </a:bodyPr>
+            <a:lstStyle/>
+            <a:p>
+              <a:r>
+                <a:rPr lang="en-IN" sz="1400" b="1" cap="small" dirty="0">
+                  <a:solidFill>
+                    <a:srgbClr val="183340"/>
+                  </a:solidFill>
+                </a:rPr>
+                <a:t>Disaster Recovery</a:t>
+              </a:r>
+            </a:p>
+          </p:txBody>
+        </p:sp>
+        <p:pic>
+          <p:nvPicPr>
+            <p:cNvPr id="68" name="Picture 67">
+              <a:extLst>
+                <a:ext uri="{FF2B5EF4-FFF2-40B4-BE49-F238E27FC236}">
+                  <a16:creationId xmlns:a16="http://schemas.microsoft.com/office/drawing/2014/main" id="{370099BF-3598-4527-AEB7-36BE43F68A69}"/>
+                </a:ext>
+              </a:extLst>
+            </p:cNvPr>
+            <p:cNvPicPr>
+              <a:picLocks noChangeAspect="1"/>
+            </p:cNvPicPr>
+            <p:nvPr/>
+          </p:nvPicPr>
+          <p:blipFill>
+            <a:blip r:embed="rId8" cstate="email">
+              <a:extLst>
+                <a:ext uri="{28A0092B-C50C-407E-A947-70E740481C1C}">
+                  <a14:useLocalDpi xmlns:a14="http://schemas.microsoft.com/office/drawing/2010/main" val="0"/>
+                </a:ext>
+              </a:extLst>
+            </a:blip>
+            <a:stretch>
+              <a:fillRect/>
+            </a:stretch>
+          </p:blipFill>
+          <p:spPr>
+            <a:xfrm>
+              <a:off x="5246698" y="940819"/>
+              <a:ext cx="273591" cy="273591"/>
+            </a:xfrm>
+            <a:prstGeom prst="rect">
+              <a:avLst/>
+            </a:prstGeom>
+          </p:spPr>
+        </p:pic>
+      </p:grpSp>
+      <p:grpSp>
+        <p:nvGrpSpPr>
+          <p:cNvPr id="180" name="Group 179">
+            <a:extLst>
+              <a:ext uri="{FF2B5EF4-FFF2-40B4-BE49-F238E27FC236}">
+                <a16:creationId xmlns:a16="http://schemas.microsoft.com/office/drawing/2014/main" id="{EE32CDEF-14B3-473D-81DF-717185851DB4}"/>
+              </a:ext>
+            </a:extLst>
+          </p:cNvPr>
+          <p:cNvGrpSpPr/>
+          <p:nvPr/>
+        </p:nvGrpSpPr>
+        <p:grpSpPr>
+          <a:xfrm>
+            <a:off x="6131513" y="2269635"/>
+            <a:ext cx="1057917" cy="608568"/>
+            <a:chOff x="5694987" y="2016698"/>
+            <a:chExt cx="793438" cy="456426"/>
+          </a:xfrm>
+        </p:grpSpPr>
+        <p:sp>
+          <p:nvSpPr>
+            <p:cNvPr id="44" name="Rectangle 43">
+              <a:extLst>
+                <a:ext uri="{FF2B5EF4-FFF2-40B4-BE49-F238E27FC236}">
+                  <a16:creationId xmlns:a16="http://schemas.microsoft.com/office/drawing/2014/main" id="{1812DC4F-5040-47C6-893F-05400FE550F2}"/>
+                </a:ext>
+              </a:extLst>
+            </p:cNvPr>
+            <p:cNvSpPr/>
+            <p:nvPr/>
+          </p:nvSpPr>
+          <p:spPr>
+            <a:xfrm>
+              <a:off x="5694987" y="2242291"/>
+              <a:ext cx="793438" cy="230833"/>
+            </a:xfrm>
+            <a:prstGeom prst="rect">
+              <a:avLst/>
+            </a:prstGeom>
+          </p:spPr>
+          <p:txBody>
+            <a:bodyPr wrap="none">
+              <a:spAutoFit/>
+            </a:bodyPr>
+            <a:lstStyle/>
+            <a:p>
+              <a:pPr algn="ctr"/>
+              <a:r>
+                <a:rPr lang="en-IN" sz="1400" b="1" cap="small" dirty="0" err="1">
+                  <a:solidFill>
+                    <a:srgbClr val="183340"/>
+                  </a:solidFill>
+                </a:rPr>
+                <a:t>IaC</a:t>
+              </a:r>
+              <a:r>
+                <a:rPr lang="en-IN" sz="1400" b="1" cap="small" dirty="0">
+                  <a:solidFill>
+                    <a:srgbClr val="183340"/>
+                  </a:solidFill>
+                </a:rPr>
+                <a:t> Dev/Ops</a:t>
+              </a:r>
+            </a:p>
+          </p:txBody>
+        </p:sp>
+        <p:pic>
+          <p:nvPicPr>
+            <p:cNvPr id="70" name="Picture 69">
+              <a:extLst>
+                <a:ext uri="{FF2B5EF4-FFF2-40B4-BE49-F238E27FC236}">
+                  <a16:creationId xmlns:a16="http://schemas.microsoft.com/office/drawing/2014/main" id="{4941566E-29AC-4E91-BED6-FA18CE3481B4}"/>
+                </a:ext>
+              </a:extLst>
+            </p:cNvPr>
+            <p:cNvPicPr>
+              <a:picLocks noChangeAspect="1"/>
+            </p:cNvPicPr>
+            <p:nvPr/>
+          </p:nvPicPr>
+          <p:blipFill>
+            <a:blip r:embed="rId9" cstate="print">
+              <a:extLst>
+                <a:ext uri="{28A0092B-C50C-407E-A947-70E740481C1C}">
+                  <a14:useLocalDpi xmlns:a14="http://schemas.microsoft.com/office/drawing/2010/main" val="0"/>
+                </a:ext>
+              </a:extLst>
+            </a:blip>
+            <a:stretch>
+              <a:fillRect/>
+            </a:stretch>
+          </p:blipFill>
+          <p:spPr>
+            <a:xfrm>
+              <a:off x="5981647" y="2016698"/>
+              <a:ext cx="224661" cy="224661"/>
+            </a:xfrm>
+            <a:prstGeom prst="rect">
+              <a:avLst/>
+            </a:prstGeom>
+          </p:spPr>
+        </p:pic>
+      </p:grpSp>
+      <p:grpSp>
+        <p:nvGrpSpPr>
+          <p:cNvPr id="165" name="Group 164">
+            <a:extLst>
+              <a:ext uri="{FF2B5EF4-FFF2-40B4-BE49-F238E27FC236}">
+                <a16:creationId xmlns:a16="http://schemas.microsoft.com/office/drawing/2014/main" id="{439DEABF-9943-46E9-BB4C-A317532647E2}"/>
+              </a:ext>
+            </a:extLst>
+          </p:cNvPr>
+          <p:cNvGrpSpPr/>
+          <p:nvPr/>
+        </p:nvGrpSpPr>
+        <p:grpSpPr>
+          <a:xfrm>
+            <a:off x="1809858" y="5252854"/>
+            <a:ext cx="1167371" cy="608181"/>
+            <a:chOff x="2234838" y="955620"/>
+            <a:chExt cx="875528" cy="456136"/>
+          </a:xfrm>
+        </p:grpSpPr>
+        <p:sp>
+          <p:nvSpPr>
+            <p:cNvPr id="43" name="Rectangle 42">
+              <a:extLst>
+                <a:ext uri="{FF2B5EF4-FFF2-40B4-BE49-F238E27FC236}">
+                  <a16:creationId xmlns:a16="http://schemas.microsoft.com/office/drawing/2014/main" id="{FDD420F5-A03C-4549-A005-361C2D1A6F13}"/>
+                </a:ext>
+              </a:extLst>
+            </p:cNvPr>
+            <p:cNvSpPr/>
+            <p:nvPr/>
+          </p:nvSpPr>
+          <p:spPr>
+            <a:xfrm>
+              <a:off x="2234838" y="1180923"/>
+              <a:ext cx="875528" cy="230833"/>
+            </a:xfrm>
+            <a:prstGeom prst="rect">
+              <a:avLst/>
+            </a:prstGeom>
+          </p:spPr>
+          <p:txBody>
+            <a:bodyPr wrap="none">
+              <a:spAutoFit/>
+            </a:bodyPr>
+            <a:lstStyle/>
+            <a:p>
+              <a:r>
+                <a:rPr lang="en-IN" sz="1400" b="1" cap="small" dirty="0">
+                  <a:solidFill>
+                    <a:schemeClr val="tx1">
+                      <a:lumMod val="75000"/>
+                      <a:lumOff val="25000"/>
+                    </a:schemeClr>
+                  </a:solidFill>
+                </a:rPr>
+                <a:t>Dev/Test Labs</a:t>
+              </a:r>
+            </a:p>
+          </p:txBody>
+        </p:sp>
+        <p:pic>
+          <p:nvPicPr>
+            <p:cNvPr id="72" name="Picture 71">
+              <a:extLst>
+                <a:ext uri="{FF2B5EF4-FFF2-40B4-BE49-F238E27FC236}">
+                  <a16:creationId xmlns:a16="http://schemas.microsoft.com/office/drawing/2014/main" id="{A5C75EE2-3C5F-4830-979E-BC478F6A5C6D}"/>
+                </a:ext>
+              </a:extLst>
+            </p:cNvPr>
+            <p:cNvPicPr>
+              <a:picLocks noChangeAspect="1"/>
+            </p:cNvPicPr>
+            <p:nvPr/>
+          </p:nvPicPr>
+          <p:blipFill>
+            <a:blip r:embed="rId10" cstate="email">
+              <a:extLst>
+                <a:ext uri="{28A0092B-C50C-407E-A947-70E740481C1C}">
+                  <a14:useLocalDpi xmlns:a14="http://schemas.microsoft.com/office/drawing/2010/main" val="0"/>
+                </a:ext>
+              </a:extLst>
+            </a:blip>
+            <a:stretch>
+              <a:fillRect/>
+            </a:stretch>
+          </p:blipFill>
+          <p:spPr>
+            <a:xfrm>
+              <a:off x="2535772" y="955620"/>
+              <a:ext cx="300950" cy="300950"/>
+            </a:xfrm>
+            <a:prstGeom prst="rect">
+              <a:avLst/>
+            </a:prstGeom>
+          </p:spPr>
+        </p:pic>
+      </p:grpSp>
+      <p:grpSp>
+        <p:nvGrpSpPr>
+          <p:cNvPr id="168" name="Group 167">
+            <a:extLst>
+              <a:ext uri="{FF2B5EF4-FFF2-40B4-BE49-F238E27FC236}">
+                <a16:creationId xmlns:a16="http://schemas.microsoft.com/office/drawing/2014/main" id="{50E4E6CF-3267-4E2C-8465-772FC8AC6F98}"/>
+              </a:ext>
+            </a:extLst>
+          </p:cNvPr>
+          <p:cNvGrpSpPr/>
+          <p:nvPr/>
+        </p:nvGrpSpPr>
+        <p:grpSpPr>
+          <a:xfrm>
+            <a:off x="3130065" y="424195"/>
+            <a:ext cx="770852" cy="689813"/>
+            <a:chOff x="863969" y="3155226"/>
+            <a:chExt cx="578139" cy="517360"/>
+          </a:xfrm>
+        </p:grpSpPr>
+        <p:sp>
+          <p:nvSpPr>
+            <p:cNvPr id="45" name="Rectangle 44">
+              <a:extLst>
+                <a:ext uri="{FF2B5EF4-FFF2-40B4-BE49-F238E27FC236}">
+                  <a16:creationId xmlns:a16="http://schemas.microsoft.com/office/drawing/2014/main" id="{F5E44CA2-4508-482C-9D91-3859490F2A85}"/>
+                </a:ext>
+              </a:extLst>
+            </p:cNvPr>
+            <p:cNvSpPr/>
+            <p:nvPr/>
+          </p:nvSpPr>
+          <p:spPr>
+            <a:xfrm>
+              <a:off x="863969" y="3441753"/>
+              <a:ext cx="578139" cy="230833"/>
+            </a:xfrm>
+            <a:prstGeom prst="rect">
+              <a:avLst/>
+            </a:prstGeom>
+          </p:spPr>
+          <p:txBody>
+            <a:bodyPr wrap="none">
+              <a:spAutoFit/>
+            </a:bodyPr>
+            <a:lstStyle/>
+            <a:p>
+              <a:r>
+                <a:rPr lang="en-IN" sz="1400" b="1" cap="small" dirty="0">
+                  <a:solidFill>
+                    <a:schemeClr val="tx1">
+                      <a:lumMod val="75000"/>
+                      <a:lumOff val="25000"/>
+                    </a:schemeClr>
+                  </a:solidFill>
+                </a:rPr>
+                <a:t>Security</a:t>
+              </a:r>
+            </a:p>
+          </p:txBody>
+        </p:sp>
+        <p:pic>
+          <p:nvPicPr>
+            <p:cNvPr id="73" name="Picture 72">
+              <a:extLst>
+                <a:ext uri="{FF2B5EF4-FFF2-40B4-BE49-F238E27FC236}">
+                  <a16:creationId xmlns:a16="http://schemas.microsoft.com/office/drawing/2014/main" id="{56516391-FE84-4B7F-AB27-F6BF575ED802}"/>
+                </a:ext>
+              </a:extLst>
+            </p:cNvPr>
+            <p:cNvPicPr>
+              <a:picLocks noChangeAspect="1"/>
+            </p:cNvPicPr>
+            <p:nvPr/>
+          </p:nvPicPr>
+          <p:blipFill>
+            <a:blip r:embed="rId11" cstate="print">
+              <a:extLst>
+                <a:ext uri="{28A0092B-C50C-407E-A947-70E740481C1C}">
+                  <a14:useLocalDpi xmlns:a14="http://schemas.microsoft.com/office/drawing/2010/main" val="0"/>
+                </a:ext>
+              </a:extLst>
+            </a:blip>
+            <a:stretch>
+              <a:fillRect/>
+            </a:stretch>
+          </p:blipFill>
+          <p:spPr>
+            <a:xfrm>
+              <a:off x="1053144" y="3155226"/>
+              <a:ext cx="263698" cy="263698"/>
+            </a:xfrm>
+            <a:prstGeom prst="rect">
+              <a:avLst/>
+            </a:prstGeom>
+          </p:spPr>
+        </p:pic>
+      </p:grpSp>
+      <p:grpSp>
+        <p:nvGrpSpPr>
+          <p:cNvPr id="181" name="Group 180">
+            <a:extLst>
+              <a:ext uri="{FF2B5EF4-FFF2-40B4-BE49-F238E27FC236}">
+                <a16:creationId xmlns:a16="http://schemas.microsoft.com/office/drawing/2014/main" id="{5B6217BA-9474-41DF-B912-CBE2418C1919}"/>
+              </a:ext>
+            </a:extLst>
+          </p:cNvPr>
+          <p:cNvGrpSpPr/>
+          <p:nvPr/>
+        </p:nvGrpSpPr>
+        <p:grpSpPr>
+          <a:xfrm>
+            <a:off x="5713129" y="3594635"/>
+            <a:ext cx="2105539" cy="756952"/>
+            <a:chOff x="5438800" y="2762549"/>
+            <a:chExt cx="1579154" cy="567714"/>
+          </a:xfrm>
+        </p:grpSpPr>
+        <p:sp>
+          <p:nvSpPr>
+            <p:cNvPr id="49" name="Rectangle 48">
+              <a:extLst>
+                <a:ext uri="{FF2B5EF4-FFF2-40B4-BE49-F238E27FC236}">
+                  <a16:creationId xmlns:a16="http://schemas.microsoft.com/office/drawing/2014/main" id="{EBEA7215-F740-4798-817A-8FBA8814780D}"/>
+                </a:ext>
+              </a:extLst>
+            </p:cNvPr>
+            <p:cNvSpPr/>
+            <p:nvPr/>
+          </p:nvSpPr>
+          <p:spPr>
+            <a:xfrm>
+              <a:off x="5438800" y="3099430"/>
+              <a:ext cx="1579154" cy="230833"/>
+            </a:xfrm>
+            <a:prstGeom prst="rect">
+              <a:avLst/>
+            </a:prstGeom>
+          </p:spPr>
+          <p:txBody>
+            <a:bodyPr wrap="square">
+              <a:spAutoFit/>
+            </a:bodyPr>
+            <a:lstStyle/>
+            <a:p>
+              <a:pPr algn="ctr"/>
+              <a:r>
+                <a:rPr lang="en-IN" sz="1400" b="1" cap="small" dirty="0">
+                  <a:solidFill>
+                    <a:srgbClr val="183340"/>
+                  </a:solidFill>
+                </a:rPr>
+                <a:t>Data Synchronization</a:t>
+              </a:r>
+            </a:p>
+          </p:txBody>
+        </p:sp>
+        <p:grpSp>
+          <p:nvGrpSpPr>
+            <p:cNvPr id="74" name="Group 73">
+              <a:extLst>
+                <a:ext uri="{FF2B5EF4-FFF2-40B4-BE49-F238E27FC236}">
+                  <a16:creationId xmlns:a16="http://schemas.microsoft.com/office/drawing/2014/main" id="{9C401AA5-065C-4990-B82A-FF1582463B70}"/>
+                </a:ext>
+              </a:extLst>
+            </p:cNvPr>
+            <p:cNvGrpSpPr/>
+            <p:nvPr/>
+          </p:nvGrpSpPr>
+          <p:grpSpPr>
+            <a:xfrm>
+              <a:off x="6059977" y="2762549"/>
+              <a:ext cx="336074" cy="336074"/>
+              <a:chOff x="7981737" y="3563546"/>
+              <a:chExt cx="542199" cy="542199"/>
+            </a:xfrm>
+          </p:grpSpPr>
+          <p:pic>
+            <p:nvPicPr>
+              <p:cNvPr id="75" name="Picture 74">
+                <a:extLst>
+                  <a:ext uri="{FF2B5EF4-FFF2-40B4-BE49-F238E27FC236}">
+                    <a16:creationId xmlns:a16="http://schemas.microsoft.com/office/drawing/2014/main" id="{889E3D8B-CBFA-4364-A239-7C45E1AF91CA}"/>
+                  </a:ext>
+                </a:extLst>
+              </p:cNvPr>
+              <p:cNvPicPr>
+                <a:picLocks noChangeAspect="1"/>
+              </p:cNvPicPr>
+              <p:nvPr/>
+            </p:nvPicPr>
+            <p:blipFill>
+              <a:blip r:embed="rId12" cstate="email">
+                <a:extLst>
+                  <a:ext uri="{28A0092B-C50C-407E-A947-70E740481C1C}">
+                    <a14:useLocalDpi xmlns:a14="http://schemas.microsoft.com/office/drawing/2010/main" val="0"/>
+                  </a:ext>
+                </a:extLst>
+              </a:blip>
+              <a:stretch>
+                <a:fillRect/>
+              </a:stretch>
+            </p:blipFill>
+            <p:spPr>
+              <a:xfrm>
+                <a:off x="7981737" y="3563546"/>
+                <a:ext cx="542199" cy="542199"/>
+              </a:xfrm>
+              <a:prstGeom prst="rect">
+                <a:avLst/>
+              </a:prstGeom>
+            </p:spPr>
+          </p:pic>
+          <p:pic>
+            <p:nvPicPr>
+              <p:cNvPr id="76" name="Picture 75">
+                <a:extLst>
+                  <a:ext uri="{FF2B5EF4-FFF2-40B4-BE49-F238E27FC236}">
+                    <a16:creationId xmlns:a16="http://schemas.microsoft.com/office/drawing/2014/main" id="{4EB12930-D240-4A10-8F5B-5D2F63B112F8}"/>
+                  </a:ext>
+                </a:extLst>
+              </p:cNvPr>
+              <p:cNvPicPr>
+                <a:picLocks noChangeAspect="1"/>
+              </p:cNvPicPr>
+              <p:nvPr/>
+            </p:nvPicPr>
+            <p:blipFill>
+              <a:blip r:embed="rId13" cstate="print">
+                <a:extLst>
+                  <a:ext uri="{28A0092B-C50C-407E-A947-70E740481C1C}">
+                    <a14:useLocalDpi xmlns:a14="http://schemas.microsoft.com/office/drawing/2010/main" val="0"/>
+                  </a:ext>
+                </a:extLst>
+              </a:blip>
+              <a:stretch>
+                <a:fillRect/>
+              </a:stretch>
+            </p:blipFill>
+            <p:spPr>
+              <a:xfrm>
+                <a:off x="8175042" y="3765451"/>
+                <a:ext cx="155587" cy="155587"/>
+              </a:xfrm>
+              <a:prstGeom prst="rect">
+                <a:avLst/>
+              </a:prstGeom>
+            </p:spPr>
+          </p:pic>
+        </p:grpSp>
+      </p:grpSp>
+      <p:grpSp>
+        <p:nvGrpSpPr>
+          <p:cNvPr id="166" name="Group 165">
+            <a:extLst>
+              <a:ext uri="{FF2B5EF4-FFF2-40B4-BE49-F238E27FC236}">
+                <a16:creationId xmlns:a16="http://schemas.microsoft.com/office/drawing/2014/main" id="{5615B1C8-2D2D-4846-A72E-1A4BEC8380C7}"/>
+              </a:ext>
+            </a:extLst>
+          </p:cNvPr>
+          <p:cNvGrpSpPr/>
+          <p:nvPr/>
+        </p:nvGrpSpPr>
+        <p:grpSpPr>
+          <a:xfrm>
+            <a:off x="1594851" y="794101"/>
+            <a:ext cx="1004058" cy="724576"/>
+            <a:chOff x="1226933" y="1347142"/>
+            <a:chExt cx="753043" cy="543432"/>
+          </a:xfrm>
+        </p:grpSpPr>
+        <p:sp>
+          <p:nvSpPr>
+            <p:cNvPr id="41" name="Rectangle 40">
+              <a:extLst>
+                <a:ext uri="{FF2B5EF4-FFF2-40B4-BE49-F238E27FC236}">
+                  <a16:creationId xmlns:a16="http://schemas.microsoft.com/office/drawing/2014/main" id="{CA334C67-02DF-4690-8368-5813156E61CD}"/>
+                </a:ext>
+              </a:extLst>
+            </p:cNvPr>
+            <p:cNvSpPr/>
+            <p:nvPr/>
+          </p:nvSpPr>
+          <p:spPr>
+            <a:xfrm>
+              <a:off x="1226933" y="1659741"/>
+              <a:ext cx="753043" cy="230833"/>
+            </a:xfrm>
+            <a:prstGeom prst="rect">
+              <a:avLst/>
+            </a:prstGeom>
+          </p:spPr>
+          <p:txBody>
+            <a:bodyPr wrap="none">
+              <a:spAutoFit/>
+            </a:bodyPr>
+            <a:lstStyle/>
+            <a:p>
+              <a:r>
+                <a:rPr lang="en-IN" sz="1400" b="1" cap="small" dirty="0">
+                  <a:solidFill>
+                    <a:srgbClr val="183340"/>
+                  </a:solidFill>
+                </a:rPr>
+                <a:t>Compliance</a:t>
+              </a:r>
+            </a:p>
+          </p:txBody>
+        </p:sp>
+        <p:pic>
+          <p:nvPicPr>
+            <p:cNvPr id="123" name="Picture 122">
+              <a:extLst>
+                <a:ext uri="{FF2B5EF4-FFF2-40B4-BE49-F238E27FC236}">
+                  <a16:creationId xmlns:a16="http://schemas.microsoft.com/office/drawing/2014/main" id="{3DB7F2FA-ECD6-450E-B514-7E6DA1CA2502}"/>
+                </a:ext>
+              </a:extLst>
+            </p:cNvPr>
+            <p:cNvPicPr>
+              <a:picLocks noChangeAspect="1"/>
+            </p:cNvPicPr>
+            <p:nvPr/>
+          </p:nvPicPr>
+          <p:blipFill>
+            <a:blip r:embed="rId14" cstate="email">
+              <a:extLst>
+                <a:ext uri="{28A0092B-C50C-407E-A947-70E740481C1C}">
+                  <a14:useLocalDpi xmlns:a14="http://schemas.microsoft.com/office/drawing/2010/main" val="0"/>
+                </a:ext>
+              </a:extLst>
+            </a:blip>
+            <a:stretch>
+              <a:fillRect/>
+            </a:stretch>
+          </p:blipFill>
+          <p:spPr>
+            <a:xfrm>
+              <a:off x="1484986" y="1347142"/>
+              <a:ext cx="330206" cy="316338"/>
+            </a:xfrm>
+            <a:prstGeom prst="rect">
+              <a:avLst/>
+            </a:prstGeom>
+          </p:spPr>
+        </p:pic>
+      </p:grpSp>
+      <p:sp>
+        <p:nvSpPr>
+          <p:cNvPr id="2" name="Oval 1">
+            <a:extLst>
+              <a:ext uri="{FF2B5EF4-FFF2-40B4-BE49-F238E27FC236}">
+                <a16:creationId xmlns:a16="http://schemas.microsoft.com/office/drawing/2014/main" id="{21B5E13E-3550-48B6-9BC7-8F988F629587}"/>
+              </a:ext>
+            </a:extLst>
+          </p:cNvPr>
+          <p:cNvSpPr/>
+          <p:nvPr/>
+        </p:nvSpPr>
+        <p:spPr>
+          <a:xfrm>
+            <a:off x="2523082" y="1890775"/>
+            <a:ext cx="2799055" cy="2773272"/>
+          </a:xfrm>
+          <a:prstGeom prst="ellipse">
+            <a:avLst/>
+          </a:prstGeom>
+          <a:solidFill>
+            <a:srgbClr val="183340"/>
+          </a:solidFill>
+          <a:ln>
+            <a:solidFill>
+              <a:srgbClr val="054466"/>
+            </a:solidFill>
+          </a:ln>
+        </p:spPr>
+        <p:style>
+          <a:lnRef idx="2">
+            <a:schemeClr val="accent1">
+              <a:shade val="50000"/>
+            </a:schemeClr>
+          </a:lnRef>
+          <a:fillRef idx="1">
+            <a:schemeClr val="accent1"/>
+          </a:fillRef>
+          <a:effectRef idx="0">
+            <a:schemeClr val="accent1"/>
+          </a:effectRef>
+          <a:fontRef idx="minor">
+            <a:schemeClr val="lt1"/>
+          </a:fontRef>
+        </p:style>
+        <p:txBody>
+          <a:bodyPr rtlCol="0" anchor="ctr"/>
+          <a:lstStyle/>
+          <a:p>
+            <a:pPr algn="ctr"/>
+            <a:r>
+              <a:rPr lang="en-US" sz="2400" dirty="0"/>
+              <a:t>Modern Datacenter</a:t>
+            </a:r>
+          </a:p>
+          <a:p>
+            <a:pPr algn="ctr"/>
+            <a:r>
+              <a:rPr lang="en-US" sz="2400" dirty="0"/>
+              <a:t>Practice</a:t>
+            </a:r>
+          </a:p>
+        </p:txBody>
+      </p:sp>
+      <p:pic>
+        <p:nvPicPr>
+          <p:cNvPr id="19" name="Picture 10" descr="http://attunixws.azurewebsites.net/wp-content/uploads/2015/10/bcdrms.png"/>
+          <p:cNvPicPr>
+            <a:picLocks noChangeAspect="1" noChangeArrowheads="1"/>
+          </p:cNvPicPr>
+          <p:nvPr/>
+        </p:nvPicPr>
+        <p:blipFill>
+          <a:blip r:embed="rId15">
+            <a:extLst>
+              <a:ext uri="{28A0092B-C50C-407E-A947-70E740481C1C}">
+                <a14:useLocalDpi xmlns:a14="http://schemas.microsoft.com/office/drawing/2010/main" val="0"/>
+              </a:ext>
+            </a:extLst>
+          </a:blip>
+          <a:srcRect/>
+          <a:stretch>
+            <a:fillRect/>
+          </a:stretch>
+        </p:blipFill>
+        <p:spPr bwMode="auto">
+          <a:xfrm>
+            <a:off x="4257849" y="3360827"/>
+            <a:ext cx="781049" cy="781051"/>
+          </a:xfrm>
+          <a:prstGeom prst="rect">
+            <a:avLst/>
+          </a:prstGeom>
+          <a:noFill/>
+          <a:extLst>
+            <a:ext uri="{909E8E84-426E-40DD-AFC4-6F175D3DCCD1}">
+              <a14:hiddenFill xmlns:a14="http://schemas.microsoft.com/office/drawing/2010/main">
+                <a:solidFill>
+                  <a:srgbClr val="FFFFFF"/>
+                </a:solidFill>
+              </a14:hiddenFill>
+            </a:ext>
+          </a:extLst>
+        </p:spPr>
+      </p:pic>
+      <p:grpSp>
+        <p:nvGrpSpPr>
+          <p:cNvPr id="172" name="Group 171">
+            <a:extLst>
+              <a:ext uri="{FF2B5EF4-FFF2-40B4-BE49-F238E27FC236}">
+                <a16:creationId xmlns:a16="http://schemas.microsoft.com/office/drawing/2014/main" id="{DD9FB008-CD94-4FAC-B3BE-BD2B806BFF2E}"/>
+              </a:ext>
+            </a:extLst>
+          </p:cNvPr>
+          <p:cNvGrpSpPr/>
+          <p:nvPr/>
+        </p:nvGrpSpPr>
+        <p:grpSpPr>
+          <a:xfrm>
+            <a:off x="-1366013" y="1126563"/>
+            <a:ext cx="564578" cy="646311"/>
+            <a:chOff x="1045809" y="3889275"/>
+            <a:chExt cx="423433" cy="484733"/>
+          </a:xfrm>
+        </p:grpSpPr>
+        <p:pic>
+          <p:nvPicPr>
+            <p:cNvPr id="14" name="Picture 13">
+              <a:extLst>
+                <a:ext uri="{FF2B5EF4-FFF2-40B4-BE49-F238E27FC236}">
+                  <a16:creationId xmlns:a16="http://schemas.microsoft.com/office/drawing/2014/main" id="{DAD24609-FA3C-4F5C-912C-915202B04295}"/>
+                </a:ext>
+              </a:extLst>
+            </p:cNvPr>
+            <p:cNvPicPr>
+              <a:picLocks noChangeAspect="1"/>
+            </p:cNvPicPr>
+            <p:nvPr/>
+          </p:nvPicPr>
+          <p:blipFill>
+            <a:blip r:embed="rId16" cstate="print">
+              <a:extLst>
+                <a:ext uri="{28A0092B-C50C-407E-A947-70E740481C1C}">
+                  <a14:useLocalDpi xmlns:a14="http://schemas.microsoft.com/office/drawing/2010/main" val="0"/>
+                </a:ext>
+              </a:extLst>
+            </a:blip>
+            <a:stretch>
+              <a:fillRect/>
+            </a:stretch>
+          </p:blipFill>
+          <p:spPr>
+            <a:xfrm>
+              <a:off x="1167990" y="3889275"/>
+              <a:ext cx="254467" cy="303775"/>
+            </a:xfrm>
+            <a:prstGeom prst="rect">
+              <a:avLst/>
+            </a:prstGeom>
+          </p:spPr>
+        </p:pic>
+        <p:sp>
+          <p:nvSpPr>
+            <p:cNvPr id="170" name="Rectangle 169">
+              <a:extLst>
+                <a:ext uri="{FF2B5EF4-FFF2-40B4-BE49-F238E27FC236}">
+                  <a16:creationId xmlns:a16="http://schemas.microsoft.com/office/drawing/2014/main" id="{4C2E8E07-AFE7-454A-B5AA-CE49104168CD}"/>
+                </a:ext>
+              </a:extLst>
+            </p:cNvPr>
+            <p:cNvSpPr/>
+            <p:nvPr/>
+          </p:nvSpPr>
+          <p:spPr>
+            <a:xfrm>
+              <a:off x="1045809" y="4143175"/>
+              <a:ext cx="423433" cy="230833"/>
+            </a:xfrm>
+            <a:prstGeom prst="rect">
+              <a:avLst/>
+            </a:prstGeom>
+          </p:spPr>
+          <p:txBody>
+            <a:bodyPr wrap="none">
+              <a:spAutoFit/>
+            </a:bodyPr>
+            <a:lstStyle/>
+            <a:p>
+              <a:r>
+                <a:rPr lang="en-IN" sz="1400" b="1" cap="small" dirty="0">
+                  <a:solidFill>
+                    <a:schemeClr val="tx1">
+                      <a:lumMod val="75000"/>
+                      <a:lumOff val="25000"/>
+                    </a:schemeClr>
+                  </a:solidFill>
+                </a:rPr>
+                <a:t>Linux</a:t>
+              </a:r>
+            </a:p>
+          </p:txBody>
+        </p:sp>
+      </p:grpSp>
+      <p:grpSp>
+        <p:nvGrpSpPr>
+          <p:cNvPr id="174" name="Group 173">
+            <a:extLst>
+              <a:ext uri="{FF2B5EF4-FFF2-40B4-BE49-F238E27FC236}">
+                <a16:creationId xmlns:a16="http://schemas.microsoft.com/office/drawing/2014/main" id="{D26D1C04-448F-45DF-88D7-4198F69C2A07}"/>
+              </a:ext>
+            </a:extLst>
+          </p:cNvPr>
+          <p:cNvGrpSpPr/>
+          <p:nvPr/>
+        </p:nvGrpSpPr>
+        <p:grpSpPr>
+          <a:xfrm>
+            <a:off x="4613501" y="527328"/>
+            <a:ext cx="690830" cy="609187"/>
+            <a:chOff x="89267" y="4448220"/>
+            <a:chExt cx="518122" cy="456890"/>
+          </a:xfrm>
+        </p:grpSpPr>
+        <p:pic>
+          <p:nvPicPr>
+            <p:cNvPr id="128" name="Picture 127">
+              <a:extLst>
+                <a:ext uri="{FF2B5EF4-FFF2-40B4-BE49-F238E27FC236}">
+                  <a16:creationId xmlns:a16="http://schemas.microsoft.com/office/drawing/2014/main" id="{DCA01FC3-60BB-4A64-A20D-DD13158F7CF2}"/>
+                </a:ext>
+              </a:extLst>
+            </p:cNvPr>
+            <p:cNvPicPr>
+              <a:picLocks noChangeAspect="1"/>
+            </p:cNvPicPr>
+            <p:nvPr/>
+          </p:nvPicPr>
+          <p:blipFill>
+            <a:blip r:embed="rId17">
+              <a:extLst>
+                <a:ext uri="{28A0092B-C50C-407E-A947-70E740481C1C}">
+                  <a14:useLocalDpi xmlns:a14="http://schemas.microsoft.com/office/drawing/2010/main" val="0"/>
+                </a:ext>
+              </a:extLst>
+            </a:blip>
+            <a:stretch>
+              <a:fillRect/>
+            </a:stretch>
+          </p:blipFill>
+          <p:spPr>
+            <a:xfrm>
+              <a:off x="185396" y="4448220"/>
+              <a:ext cx="378732" cy="232650"/>
+            </a:xfrm>
+            <a:prstGeom prst="rect">
+              <a:avLst/>
+            </a:prstGeom>
+          </p:spPr>
+        </p:pic>
+        <p:sp>
+          <p:nvSpPr>
+            <p:cNvPr id="171" name="Rectangle 170">
+              <a:extLst>
+                <a:ext uri="{FF2B5EF4-FFF2-40B4-BE49-F238E27FC236}">
+                  <a16:creationId xmlns:a16="http://schemas.microsoft.com/office/drawing/2014/main" id="{C672C41B-B57A-4646-95CE-AA21D876BB02}"/>
+                </a:ext>
+              </a:extLst>
+            </p:cNvPr>
+            <p:cNvSpPr/>
+            <p:nvPr/>
+          </p:nvSpPr>
+          <p:spPr>
+            <a:xfrm>
+              <a:off x="89267" y="4674277"/>
+              <a:ext cx="518122" cy="230833"/>
+            </a:xfrm>
+            <a:prstGeom prst="rect">
+              <a:avLst/>
+            </a:prstGeom>
+          </p:spPr>
+          <p:txBody>
+            <a:bodyPr wrap="none">
+              <a:spAutoFit/>
+            </a:bodyPr>
+            <a:lstStyle/>
+            <a:p>
+              <a:r>
+                <a:rPr lang="en-IN" sz="1400" b="1" cap="small" dirty="0">
+                  <a:solidFill>
+                    <a:schemeClr val="tx1">
+                      <a:lumMod val="75000"/>
+                      <a:lumOff val="25000"/>
+                    </a:schemeClr>
+                  </a:solidFill>
+                </a:rPr>
+                <a:t>Backup</a:t>
+              </a:r>
+            </a:p>
+          </p:txBody>
+        </p:sp>
+      </p:grpSp>
+      <p:grpSp>
+        <p:nvGrpSpPr>
+          <p:cNvPr id="187" name="Group 186">
+            <a:extLst>
+              <a:ext uri="{FF2B5EF4-FFF2-40B4-BE49-F238E27FC236}">
+                <a16:creationId xmlns:a16="http://schemas.microsoft.com/office/drawing/2014/main" id="{60CE8B14-4FA9-4ED2-BED9-8BC4CAFA3E46}"/>
+              </a:ext>
+            </a:extLst>
+          </p:cNvPr>
+          <p:cNvGrpSpPr/>
+          <p:nvPr/>
+        </p:nvGrpSpPr>
+        <p:grpSpPr>
+          <a:xfrm>
+            <a:off x="5313623" y="4727820"/>
+            <a:ext cx="2105539" cy="604867"/>
+            <a:chOff x="4948545" y="3654901"/>
+            <a:chExt cx="1579154" cy="453650"/>
+          </a:xfrm>
+        </p:grpSpPr>
+        <p:pic>
+          <p:nvPicPr>
+            <p:cNvPr id="61" name="Picture 60">
+              <a:extLst>
+                <a:ext uri="{FF2B5EF4-FFF2-40B4-BE49-F238E27FC236}">
+                  <a16:creationId xmlns:a16="http://schemas.microsoft.com/office/drawing/2014/main" id="{480D9BEB-29FC-4855-9442-2B96B8E6237B}"/>
+                </a:ext>
+              </a:extLst>
+            </p:cNvPr>
+            <p:cNvPicPr>
+              <a:picLocks noChangeAspect="1"/>
+            </p:cNvPicPr>
+            <p:nvPr/>
+          </p:nvPicPr>
+          <p:blipFill>
+            <a:blip r:embed="rId18" cstate="email">
+              <a:extLst>
+                <a:ext uri="{28A0092B-C50C-407E-A947-70E740481C1C}">
+                  <a14:useLocalDpi xmlns:a14="http://schemas.microsoft.com/office/drawing/2010/main" val="0"/>
+                </a:ext>
+              </a:extLst>
+            </a:blip>
+            <a:stretch>
+              <a:fillRect/>
+            </a:stretch>
+          </p:blipFill>
+          <p:spPr>
+            <a:xfrm>
+              <a:off x="5628968" y="3654901"/>
+              <a:ext cx="226108" cy="226108"/>
+            </a:xfrm>
+            <a:prstGeom prst="rect">
+              <a:avLst/>
+            </a:prstGeom>
+          </p:spPr>
+        </p:pic>
+        <p:sp>
+          <p:nvSpPr>
+            <p:cNvPr id="186" name="Rectangle 185">
+              <a:extLst>
+                <a:ext uri="{FF2B5EF4-FFF2-40B4-BE49-F238E27FC236}">
+                  <a16:creationId xmlns:a16="http://schemas.microsoft.com/office/drawing/2014/main" id="{C14BC378-0232-4B9D-9D95-82443D53D6CC}"/>
+                </a:ext>
+              </a:extLst>
+            </p:cNvPr>
+            <p:cNvSpPr/>
+            <p:nvPr/>
+          </p:nvSpPr>
+          <p:spPr>
+            <a:xfrm>
+              <a:off x="4948545" y="3877718"/>
+              <a:ext cx="1579154" cy="230833"/>
+            </a:xfrm>
+            <a:prstGeom prst="rect">
+              <a:avLst/>
+            </a:prstGeom>
+          </p:spPr>
+          <p:txBody>
+            <a:bodyPr wrap="square">
+              <a:spAutoFit/>
+            </a:bodyPr>
+            <a:lstStyle/>
+            <a:p>
+              <a:pPr algn="ctr"/>
+              <a:r>
+                <a:rPr lang="en-IN" sz="1400" b="1" cap="small" dirty="0">
+                  <a:solidFill>
+                    <a:srgbClr val="183340"/>
+                  </a:solidFill>
+                </a:rPr>
+                <a:t>Migration</a:t>
+              </a:r>
+            </a:p>
+          </p:txBody>
+        </p:sp>
+      </p:grpSp>
+      <p:sp>
+        <p:nvSpPr>
+          <p:cNvPr id="220" name="Rectangle 219">
+            <a:extLst>
+              <a:ext uri="{FF2B5EF4-FFF2-40B4-BE49-F238E27FC236}">
+                <a16:creationId xmlns:a16="http://schemas.microsoft.com/office/drawing/2014/main" id="{E6530BB0-9E08-40F7-BCCC-8C88B61F861A}"/>
+              </a:ext>
+            </a:extLst>
+          </p:cNvPr>
+          <p:cNvSpPr/>
+          <p:nvPr/>
+        </p:nvSpPr>
+        <p:spPr>
+          <a:xfrm>
+            <a:off x="8453218" y="319874"/>
+            <a:ext cx="3682561" cy="3539430"/>
+          </a:xfrm>
+          <a:prstGeom prst="rect">
+            <a:avLst/>
+          </a:prstGeom>
+        </p:spPr>
+        <p:txBody>
+          <a:bodyPr wrap="square">
+            <a:spAutoFit/>
+          </a:bodyPr>
+          <a:lstStyle/>
+          <a:p>
+            <a:pPr algn="ctr"/>
+            <a:r>
+              <a:rPr lang="en-US" sz="3200" dirty="0">
+                <a:solidFill>
+                  <a:srgbClr val="054466"/>
+                </a:solidFill>
+                <a:latin typeface="Segoe UI" panose="020B0502040204020203" pitchFamily="34" charset="0"/>
+                <a:cs typeface="Segoe UI" panose="020B0502040204020203" pitchFamily="34" charset="0"/>
+              </a:rPr>
+              <a:t>Cloud Focused IT Transformation Services </a:t>
+            </a:r>
+          </a:p>
+          <a:p>
+            <a:pPr algn="ctr"/>
+            <a:endParaRPr lang="en-US" sz="3200" dirty="0">
+              <a:solidFill>
+                <a:srgbClr val="054466"/>
+              </a:solidFill>
+              <a:latin typeface="Segoe UI" panose="020B0502040204020203" pitchFamily="34" charset="0"/>
+              <a:cs typeface="Segoe UI" panose="020B0502040204020203" pitchFamily="34" charset="0"/>
+            </a:endParaRPr>
+          </a:p>
+          <a:p>
+            <a:pPr algn="ctr"/>
+            <a:r>
+              <a:rPr lang="en-US" sz="3200" dirty="0">
+                <a:solidFill>
+                  <a:srgbClr val="054466"/>
+                </a:solidFill>
+                <a:latin typeface="Segoe UI" panose="020B0502040204020203" pitchFamily="34" charset="0"/>
+                <a:cs typeface="Segoe UI" panose="020B0502040204020203" pitchFamily="34" charset="0"/>
+              </a:rPr>
+              <a:t>Attunix Modern</a:t>
+            </a:r>
+          </a:p>
+          <a:p>
+            <a:pPr algn="ctr"/>
+            <a:r>
+              <a:rPr lang="en-US" sz="3200" dirty="0">
+                <a:solidFill>
+                  <a:srgbClr val="054466"/>
+                </a:solidFill>
+                <a:latin typeface="Segoe UI" panose="020B0502040204020203" pitchFamily="34" charset="0"/>
+                <a:cs typeface="Segoe UI" panose="020B0502040204020203" pitchFamily="34" charset="0"/>
+              </a:rPr>
+              <a:t>Datacenter</a:t>
+            </a:r>
+          </a:p>
+          <a:p>
+            <a:pPr algn="ctr"/>
+            <a:r>
+              <a:rPr lang="en-US" sz="3200" dirty="0">
+                <a:solidFill>
+                  <a:srgbClr val="054466"/>
+                </a:solidFill>
+                <a:latin typeface="Segoe UI" panose="020B0502040204020203" pitchFamily="34" charset="0"/>
+                <a:cs typeface="Segoe UI" panose="020B0502040204020203" pitchFamily="34" charset="0"/>
+              </a:rPr>
+              <a:t>Practice</a:t>
+            </a:r>
+          </a:p>
+        </p:txBody>
+      </p:sp>
+      <p:sp>
+        <p:nvSpPr>
+          <p:cNvPr id="222" name="Rectangle 221">
+            <a:extLst>
+              <a:ext uri="{FF2B5EF4-FFF2-40B4-BE49-F238E27FC236}">
+                <a16:creationId xmlns:a16="http://schemas.microsoft.com/office/drawing/2014/main" id="{DD69F74B-6620-4123-9B9A-BB7B027E2B98}"/>
+              </a:ext>
+            </a:extLst>
+          </p:cNvPr>
+          <p:cNvSpPr/>
+          <p:nvPr/>
+        </p:nvSpPr>
+        <p:spPr>
+          <a:xfrm>
+            <a:off x="8188654" y="-1"/>
+            <a:ext cx="255300" cy="6858001"/>
+          </a:xfrm>
+          <a:prstGeom prst="rect">
+            <a:avLst/>
+          </a:prstGeom>
+          <a:solidFill>
+            <a:srgbClr val="DD8822"/>
+          </a:solidFill>
+          <a:ln>
+            <a:noFill/>
+          </a:ln>
+        </p:spPr>
+        <p:style>
+          <a:lnRef idx="2">
+            <a:schemeClr val="accent1">
+              <a:shade val="50000"/>
+            </a:schemeClr>
+          </a:lnRef>
+          <a:fillRef idx="1">
+            <a:schemeClr val="accent1"/>
+          </a:fillRef>
+          <a:effectRef idx="0">
+            <a:schemeClr val="accent1"/>
+          </a:effectRef>
+          <a:fontRef idx="minor">
+            <a:schemeClr val="lt1"/>
+          </a:fontRef>
+        </p:style>
+        <p:txBody>
+          <a:bodyPr rtlCol="0" anchor="ctr"/>
+          <a:lstStyle/>
+          <a:p>
+            <a:pPr algn="ctr"/>
+            <a:endParaRPr lang="en-US" sz="2400"/>
+          </a:p>
+        </p:txBody>
+      </p:sp>
+      <p:pic>
+        <p:nvPicPr>
+          <p:cNvPr id="4" name="Picture 3" descr="A close up of a logo&#10;&#10;Description generated with very high confidence">
+            <a:extLst>
+              <a:ext uri="{FF2B5EF4-FFF2-40B4-BE49-F238E27FC236}">
+                <a16:creationId xmlns:a16="http://schemas.microsoft.com/office/drawing/2014/main" id="{CA1FD09D-FFB9-4428-B731-51753F7EF16C}"/>
+              </a:ext>
+            </a:extLst>
+          </p:cNvPr>
+          <p:cNvPicPr>
+            <a:picLocks noChangeAspect="1"/>
+          </p:cNvPicPr>
+          <p:nvPr/>
+        </p:nvPicPr>
+        <p:blipFill>
+          <a:blip r:embed="rId19" cstate="print">
+            <a:extLst>
+              <a:ext uri="{28A0092B-C50C-407E-A947-70E740481C1C}">
+                <a14:useLocalDpi xmlns:a14="http://schemas.microsoft.com/office/drawing/2010/main" val="0"/>
+              </a:ext>
+            </a:extLst>
+          </a:blip>
+          <a:stretch>
+            <a:fillRect/>
+          </a:stretch>
+        </p:blipFill>
+        <p:spPr>
+          <a:xfrm>
+            <a:off x="-1255268" y="1831222"/>
+            <a:ext cx="547511" cy="547511"/>
+          </a:xfrm>
+          <a:prstGeom prst="rect">
+            <a:avLst/>
+          </a:prstGeom>
+        </p:spPr>
+      </p:pic>
+      <p:grpSp>
+        <p:nvGrpSpPr>
+          <p:cNvPr id="7" name="Group 6">
+            <a:extLst>
+              <a:ext uri="{FF2B5EF4-FFF2-40B4-BE49-F238E27FC236}">
+                <a16:creationId xmlns:a16="http://schemas.microsoft.com/office/drawing/2014/main" id="{B283A6BE-B0E7-4210-B808-F6A6FFFC4C2F}"/>
+              </a:ext>
+            </a:extLst>
+          </p:cNvPr>
+          <p:cNvGrpSpPr/>
+          <p:nvPr/>
+        </p:nvGrpSpPr>
+        <p:grpSpPr>
+          <a:xfrm>
+            <a:off x="517880" y="3115728"/>
+            <a:ext cx="1728230" cy="783369"/>
+            <a:chOff x="388410" y="2336795"/>
+            <a:chExt cx="1296172" cy="587527"/>
+          </a:xfrm>
+        </p:grpSpPr>
+        <p:sp>
+          <p:nvSpPr>
+            <p:cNvPr id="169" name="Rectangle 168">
+              <a:extLst>
+                <a:ext uri="{FF2B5EF4-FFF2-40B4-BE49-F238E27FC236}">
+                  <a16:creationId xmlns:a16="http://schemas.microsoft.com/office/drawing/2014/main" id="{414BD78A-7BF3-41FF-9E98-E9E92B2B44DF}"/>
+                </a:ext>
+              </a:extLst>
+            </p:cNvPr>
+            <p:cNvSpPr/>
+            <p:nvPr/>
+          </p:nvSpPr>
+          <p:spPr>
+            <a:xfrm>
+              <a:off x="388410" y="2693489"/>
+              <a:ext cx="1296172" cy="230833"/>
+            </a:xfrm>
+            <a:prstGeom prst="rect">
+              <a:avLst/>
+            </a:prstGeom>
+          </p:spPr>
+          <p:txBody>
+            <a:bodyPr wrap="none">
+              <a:spAutoFit/>
+            </a:bodyPr>
+            <a:lstStyle/>
+            <a:p>
+              <a:r>
+                <a:rPr lang="en-IN" sz="1400" b="1" cap="small" dirty="0">
+                  <a:solidFill>
+                    <a:schemeClr val="tx1">
+                      <a:lumMod val="75000"/>
+                      <a:lumOff val="25000"/>
+                    </a:schemeClr>
+                  </a:solidFill>
+                </a:rPr>
+                <a:t>Identity Management</a:t>
+              </a:r>
+            </a:p>
+          </p:txBody>
+        </p:sp>
+        <p:pic>
+          <p:nvPicPr>
+            <p:cNvPr id="6" name="Picture 5">
+              <a:extLst>
+                <a:ext uri="{FF2B5EF4-FFF2-40B4-BE49-F238E27FC236}">
+                  <a16:creationId xmlns:a16="http://schemas.microsoft.com/office/drawing/2014/main" id="{06CB2291-4E37-4791-A000-D472477743EA}"/>
+                </a:ext>
+              </a:extLst>
+            </p:cNvPr>
+            <p:cNvPicPr>
+              <a:picLocks noChangeAspect="1"/>
+            </p:cNvPicPr>
+            <p:nvPr/>
+          </p:nvPicPr>
+          <p:blipFill>
+            <a:blip r:embed="rId20" cstate="print">
+              <a:extLst>
+                <a:ext uri="{28A0092B-C50C-407E-A947-70E740481C1C}">
+                  <a14:useLocalDpi xmlns:a14="http://schemas.microsoft.com/office/drawing/2010/main" val="0"/>
+                </a:ext>
+              </a:extLst>
+            </a:blip>
+            <a:stretch>
+              <a:fillRect/>
+            </a:stretch>
+          </p:blipFill>
+          <p:spPr>
+            <a:xfrm>
+              <a:off x="899464" y="2336795"/>
+              <a:ext cx="347299" cy="347299"/>
+            </a:xfrm>
+            <a:prstGeom prst="rect">
+              <a:avLst/>
+            </a:prstGeom>
+          </p:spPr>
+        </p:pic>
+      </p:grpSp>
+    </p:spTree>
+    <p:extLst>
+      <p:ext uri="{BB962C8B-B14F-4D97-AF65-F5344CB8AC3E}">
+        <p14:creationId xmlns:p14="http://schemas.microsoft.com/office/powerpoint/2010/main" val="1578133512"/>
+      </p:ext>
+    </p:extLst>
+  </p:cSld>
+  <p:clrMapOvr>
+    <a:masterClrMapping/>
+  </p:clrMapOvr>
+  <p:transition>
+    <p:dissolve/>
+  </p:transition>
+  <p:timing>
+    <p:tnLst>
+      <p:par>
+        <p:cTn id="1" dur="indefinite" restart="never" nodeType="tmRoot">
+          <p:childTnLst>
+            <p:seq concurrent="1" nextAc="seek">
+              <p:cTn id="2" dur="indefinite" nodeType="mainSeq">
+                <p:childTnLst>
+                  <p:par>
+                    <p:cTn id="3" fill="hold">
+                      <p:stCondLst>
+                        <p:cond delay="indefinite"/>
+                        <p:cond evt="onBegin" delay="0">
+                          <p:tn val="2"/>
+                        </p:cond>
+                      </p:stCondLst>
+                      <p:childTnLst>
+                        <p:par>
+                          <p:cTn id="4" fill="hold">
+                            <p:stCondLst>
+                              <p:cond delay="0"/>
+                            </p:stCondLst>
+                            <p:childTnLst>
+                              <p:par>
+                                <p:cTn id="5" presetID="10" presetClass="entr" presetSubtype="0" fill="hold" nodeType="withEffect">
+                                  <p:stCondLst>
+                                    <p:cond delay="500"/>
+                                  </p:stCondLst>
+                                  <p:childTnLst>
+                                    <p:set>
+                                      <p:cBhvr>
+                                        <p:cTn id="6" dur="1" fill="hold">
+                                          <p:stCondLst>
+                                            <p:cond delay="0"/>
+                                          </p:stCondLst>
+                                        </p:cTn>
+                                        <p:tgtEl>
+                                          <p:spTgt spid="19"/>
+                                        </p:tgtEl>
+                                        <p:attrNameLst>
+                                          <p:attrName>style.visibility</p:attrName>
+                                        </p:attrNameLst>
+                                      </p:cBhvr>
+                                      <p:to>
+                                        <p:strVal val="visible"/>
+                                      </p:to>
+                                    </p:set>
+                                    <p:animEffect transition="in" filter="fade">
+                                      <p:cBhvr>
+                                        <p:cTn id="7" dur="500"/>
+                                        <p:tgtEl>
+                                          <p:spTgt spid="19"/>
+                                        </p:tgtEl>
+                                      </p:cBhvr>
+                                    </p:animEffect>
+                                  </p:childTnLst>
+                                </p:cTn>
+                              </p:par>
+                            </p:childTnLst>
+                          </p:cTn>
+                        </p:par>
+                      </p:childTnLst>
+                    </p:cTn>
+                  </p:par>
+                </p:childTnLst>
+              </p:cTn>
+              <p:prevCondLst>
+                <p:cond evt="onPrev" delay="0">
+                  <p:tgtEl>
+                    <p:sldTgt/>
+                  </p:tgtEl>
+                </p:cond>
+              </p:prevCondLst>
+              <p:nextCondLst>
+                <p:cond evt="onNext" delay="0">
+                  <p:tgtEl>
+                    <p:sldTgt/>
+                  </p:tgtEl>
+                </p:cond>
+              </p:nextCondLst>
+            </p:seq>
+          </p:childTnLst>
+        </p:cTn>
+      </p:par>
+    </p:tnLst>
+  </p:timing>
+</p:sld>
+</file>
+
+<file path=ppt/slides/slide7.xml><?xml version="1.0" encoding="utf-8"?>
+<p:sld xmlns:a="http://schemas.openxmlformats.org/drawingml/2006/main" xmlns:r="http://schemas.openxmlformats.org/officeDocument/2006/relationships" xmlns:p="http://schemas.openxmlformats.org/presentationml/2006/main">
+  <p:cSld>
+    <p:spTree>
+      <p:nvGrpSpPr>
+        <p:cNvPr id="1" name=""/>
+        <p:cNvGrpSpPr/>
+        <p:nvPr/>
+      </p:nvGrpSpPr>
+      <p:grpSpPr>
+        <a:xfrm>
+          <a:off x="0" y="0"/>
+          <a:ext cx="0" cy="0"/>
+          <a:chOff x="0" y="0"/>
+          <a:chExt cx="0" cy="0"/>
+        </a:xfrm>
+      </p:grpSpPr>
+      <p:sp>
+        <p:nvSpPr>
+          <p:cNvPr id="2" name="Title 1"/>
+          <p:cNvSpPr>
+            <a:spLocks noGrp="1"/>
+          </p:cNvSpPr>
+          <p:nvPr>
+            <p:ph type="title"/>
+          </p:nvPr>
+        </p:nvSpPr>
+        <p:spPr>
+          <a:xfrm>
+            <a:off x="6705600" y="3118507"/>
+            <a:ext cx="4876800" cy="609398"/>
+          </a:xfrm>
+        </p:spPr>
+        <p:txBody>
+          <a:bodyPr/>
+          <a:lstStyle/>
+          <a:p>
+            <a:r>
+              <a:rPr lang="en-US" dirty="0">
+                <a:latin typeface="Segoe UI" panose="020B0502040204020203" pitchFamily="34" charset="0"/>
+                <a:cs typeface="Segoe UI" panose="020B0502040204020203" pitchFamily="34" charset="0"/>
+              </a:rPr>
+              <a:t>Thank You</a:t>
+            </a:r>
+          </a:p>
+        </p:txBody>
+      </p:sp>
+    </p:spTree>
+    <p:extLst>
+      <p:ext uri="{BB962C8B-B14F-4D97-AF65-F5344CB8AC3E}">
+        <p14:creationId xmlns:p14="http://schemas.microsoft.com/office/powerpoint/2010/main" val="2917239427"/>
+      </p:ext>
+    </p:extLst>
+  </p:cSld>
+  <p:clrMapOvr>
+    <a:masterClrMapping/>
+  </p:clrMapOvr>
+  <p:transition>
+    <p:dissolve/>
+  </p:transition>
 </p:sld>
 </file>
 

</xml_diff>